<commit_message>
General cleanup of Base Repository and Benchmark tests
</commit_message>
<xml_diff>
--- a/20160128 Tech Punch - Entity Framework.pptx
+++ b/20160128 Tech Punch - Entity Framework.pptx
@@ -5,17 +5,16 @@
     <p:sldMasterId id="2147483815" r:id="rId5"/>
   </p:sldMasterIdLst>
   <p:notesMasterIdLst>
-    <p:notesMasterId r:id="rId14"/>
+    <p:notesMasterId r:id="rId13"/>
   </p:notesMasterIdLst>
   <p:sldIdLst>
     <p:sldId id="326" r:id="rId6"/>
     <p:sldId id="325" r:id="rId7"/>
     <p:sldId id="327" r:id="rId8"/>
-    <p:sldId id="346" r:id="rId9"/>
-    <p:sldId id="328" r:id="rId10"/>
-    <p:sldId id="329" r:id="rId11"/>
-    <p:sldId id="330" r:id="rId12"/>
-    <p:sldId id="345" r:id="rId13"/>
+    <p:sldId id="328" r:id="rId9"/>
+    <p:sldId id="329" r:id="rId10"/>
+    <p:sldId id="330" r:id="rId11"/>
+    <p:sldId id="345" r:id="rId12"/>
   </p:sldIdLst>
   <p:sldSz cx="9906000" cy="6858000" type="A4"/>
   <p:notesSz cx="6797675" cy="9874250"/>
@@ -25,7 +24,7 @@
     </p:custShow>
   </p:custShowLst>
   <p:custDataLst>
-    <p:tags r:id="rId15"/>
+    <p:tags r:id="rId14"/>
   </p:custDataLst>
   <p:defaultTextStyle>
     <a:defPPr>
@@ -154,7 +153,7 @@
   </p:defaultTextStyle>
   <p:extLst>
     <p:ext uri="{EFAFB233-063F-42B5-8137-9DF3F51BA10A}">
-      <p15:sldGuideLst xmlns:p15="http://schemas.microsoft.com/office/powerpoint/2012/main" xmlns="">
+      <p15:sldGuideLst xmlns="" xmlns:p15="http://schemas.microsoft.com/office/powerpoint/2012/main">
         <p15:guide id="1" orient="horz" pos="335">
           <p15:clr>
             <a:srgbClr val="A4A3A4"/>
@@ -372,7 +371,7 @@
               <a:pPr>
                 <a:defRPr/>
               </a:pPr>
-              <a:t>09/01/2016</a:t>
+              <a:t>16/01/2016</a:t>
             </a:fld>
             <a:endParaRPr lang="en-GB" dirty="0"/>
           </a:p>
@@ -8916,7 +8915,7 @@
           <a:graphicData uri="http://schemas.openxmlformats.org/presentationml/2006/ole">
             <mc:AlternateContent xmlns:mc="http://schemas.openxmlformats.org/markup-compatibility/2006">
               <mc:Choice xmlns:v="urn:schemas-microsoft-com:vml" Requires="v">
-                <p:oleObj spid="_x0000_s2100" name="think-cell Slide" r:id="rId28" imgW="360" imgH="360" progId="">
+                <p:oleObj spid="_x0000_s2101" name="think-cell Slide" r:id="rId28" imgW="360" imgH="360" progId="">
                   <p:embed/>
                 </p:oleObj>
               </mc:Choice>
@@ -10334,7 +10333,10 @@
           <a:bodyPr/>
           <a:lstStyle/>
           <a:p>
-            <a:endParaRPr lang="en-GB" dirty="0"/>
+            <a:r>
+              <a:rPr lang="en-GB" dirty="0"/>
+              <a:t>Entity Framework 6.1.1 Feature Mind Map</a:t>
+            </a:r>
           </a:p>
         </p:txBody>
       </p:sp>
@@ -10353,7 +10355,87 @@
           <a:bodyPr/>
           <a:lstStyle/>
           <a:p>
+            <a:r>
+              <a:rPr lang="en-GB" dirty="0" smtClean="0"/>
+              <a:t>Entity framework </a:t>
+            </a:r>
+            <a:r>
+              <a:rPr lang="en-GB" dirty="0" err="1" smtClean="0"/>
+              <a:t>Linq</a:t>
+            </a:r>
+            <a:r>
+              <a:rPr lang="en-GB" dirty="0" smtClean="0"/>
+              <a:t> Provider</a:t>
+            </a:r>
+          </a:p>
+          <a:p>
+            <a:pPr lvl="1"/>
+            <a:r>
+              <a:rPr lang="en-GB" dirty="0" smtClean="0"/>
+              <a:t>Lazy vs Eager loading of entities</a:t>
+            </a:r>
+          </a:p>
+          <a:p>
+            <a:r>
+              <a:rPr lang="en-GB" dirty="0" smtClean="0"/>
+              <a:t>Model First</a:t>
+            </a:r>
+          </a:p>
+          <a:p>
+            <a:r>
+              <a:rPr lang="en-GB" dirty="0"/>
+              <a:t>Code first</a:t>
+            </a:r>
+          </a:p>
+          <a:p>
+            <a:pPr lvl="1"/>
+            <a:r>
+              <a:rPr lang="en-GB" dirty="0"/>
+              <a:t>Code first </a:t>
+            </a:r>
+            <a:r>
+              <a:rPr lang="en-GB" dirty="0" smtClean="0"/>
+              <a:t>reengineering (Entity Framework Power Tools)</a:t>
+            </a:r>
             <a:endParaRPr lang="en-GB" dirty="0"/>
+          </a:p>
+          <a:p>
+            <a:pPr lvl="2"/>
+            <a:r>
+              <a:rPr lang="en-GB" dirty="0"/>
+              <a:t>Entity Framework Power tools</a:t>
+            </a:r>
+          </a:p>
+          <a:p>
+            <a:pPr lvl="2"/>
+            <a:r>
+              <a:rPr lang="en-GB" dirty="0" err="1"/>
+              <a:t>Sdf</a:t>
+            </a:r>
+            <a:endParaRPr lang="en-GB" dirty="0"/>
+          </a:p>
+          <a:p>
+            <a:r>
+              <a:rPr lang="en-GB" dirty="0" smtClean="0"/>
+              <a:t>Db Migrations</a:t>
+            </a:r>
+          </a:p>
+          <a:p>
+            <a:pPr lvl="1"/>
+            <a:r>
+              <a:rPr lang="en-GB" dirty="0" smtClean="0"/>
+              <a:t>Using the DB Migrator to generate SQL from Migration files</a:t>
+            </a:r>
+          </a:p>
+          <a:p>
+            <a:r>
+              <a:rPr lang="en-GB" dirty="0" smtClean="0"/>
+              <a:t>Entity caching</a:t>
+            </a:r>
+          </a:p>
+          <a:p>
+            <a:pPr lvl="1"/>
+            <a:endParaRPr lang="en-GB" dirty="0" smtClean="0"/>
           </a:p>
         </p:txBody>
       </p:sp>
@@ -10379,7 +10461,7 @@
     </p:spTree>
     <p:extLst>
       <p:ext uri="{BB962C8B-B14F-4D97-AF65-F5344CB8AC3E}">
-        <p14:creationId xmlns:p14="http://schemas.microsoft.com/office/powerpoint/2010/main" val="2052499365"/>
+        <p14:creationId xmlns:p14="http://schemas.microsoft.com/office/powerpoint/2010/main" val="565120836"/>
       </p:ext>
     </p:extLst>
   </p:cSld>
@@ -10425,9 +10507,10 @@
           <a:lstStyle/>
           <a:p>
             <a:r>
-              <a:rPr lang="en-GB" dirty="0"/>
-              <a:t>Entity Framework 6.1.1 Feature Mind Map</a:t>
-            </a:r>
+              <a:rPr lang="en-GB" dirty="0" smtClean="0"/>
+              <a:t>Entity Framework 6 New Features</a:t>
+            </a:r>
+            <a:endParaRPr lang="en-GB" dirty="0"/>
           </a:p>
         </p:txBody>
       </p:sp>
@@ -10448,85 +10531,74 @@
           <a:p>
             <a:r>
               <a:rPr lang="en-GB" dirty="0" smtClean="0"/>
-              <a:t>Entity framework </a:t>
-            </a:r>
+              <a:t>Asynchronous query and save</a:t>
+            </a:r>
+          </a:p>
+          <a:p>
+            <a:r>
+              <a:rPr lang="en-GB" dirty="0" smtClean="0"/>
+              <a:t>Connection resiliency</a:t>
+            </a:r>
+          </a:p>
+          <a:p>
+            <a:r>
+              <a:rPr lang="en-GB" dirty="0" smtClean="0"/>
+              <a:t>Code based configuration</a:t>
+            </a:r>
+          </a:p>
+          <a:p>
+            <a:r>
+              <a:rPr lang="en-GB" dirty="0" smtClean="0"/>
+              <a:t>Database command interception and logging</a:t>
+            </a:r>
+          </a:p>
+          <a:p>
+            <a:r>
+              <a:rPr lang="en-GB" dirty="0" smtClean="0"/>
+              <a:t>Code first CRUD stored procedures</a:t>
+            </a:r>
+          </a:p>
+          <a:p>
+            <a:r>
+              <a:rPr lang="en-GB" dirty="0" smtClean="0"/>
+              <a:t>Multiple contexts per database</a:t>
+            </a:r>
+          </a:p>
+          <a:p>
+            <a:r>
+              <a:rPr lang="en-GB" dirty="0" smtClean="0"/>
+              <a:t>Default transaction level for generated code first DB is now READ_COMMITTED_SNAPSHOT</a:t>
+            </a:r>
+          </a:p>
+          <a:p>
             <a:r>
               <a:rPr lang="en-GB" dirty="0" err="1" smtClean="0"/>
-              <a:t>Linq</a:t>
+              <a:t>Enums</a:t>
             </a:r>
             <a:r>
               <a:rPr lang="en-GB" dirty="0" smtClean="0"/>
-              <a:t> Provider</a:t>
-            </a:r>
-          </a:p>
-          <a:p>
-            <a:pPr lvl="1"/>
+              <a:t> and spatial support</a:t>
+            </a:r>
+          </a:p>
+          <a:p>
             <a:r>
               <a:rPr lang="en-GB" dirty="0" smtClean="0"/>
-              <a:t>Lazy vs Eager loading of entities</a:t>
+              <a:t>Nested Entity Types</a:t>
             </a:r>
           </a:p>
           <a:p>
             <a:r>
               <a:rPr lang="en-GB" dirty="0" smtClean="0"/>
-              <a:t>Model First</a:t>
-            </a:r>
-          </a:p>
-          <a:p>
-            <a:r>
-              <a:rPr lang="en-GB" dirty="0"/>
-              <a:t>Code first</a:t>
-            </a:r>
-          </a:p>
-          <a:p>
-            <a:pPr lvl="1"/>
-            <a:r>
-              <a:rPr lang="en-GB" dirty="0"/>
-              <a:t>Code first </a:t>
-            </a:r>
-            <a:r>
-              <a:rPr lang="en-GB" dirty="0" smtClean="0"/>
-              <a:t>reengineering (Entity Framework Power Tools)</a:t>
-            </a:r>
+              <a:t>Support for a default Schema – </a:t>
+            </a:r>
+            <a:r>
+              <a:rPr lang="en-GB" dirty="0" err="1" smtClean="0"/>
+              <a:t>DBModelBuilder.HasDefaultSchema</a:t>
+            </a:r>
+            <a:endParaRPr lang="en-GB" dirty="0" smtClean="0"/>
+          </a:p>
+          <a:p>
             <a:endParaRPr lang="en-GB" dirty="0"/>
-          </a:p>
-          <a:p>
-            <a:pPr lvl="2"/>
-            <a:r>
-              <a:rPr lang="en-GB" dirty="0"/>
-              <a:t>Entity Framework Power tools</a:t>
-            </a:r>
-          </a:p>
-          <a:p>
-            <a:pPr lvl="2"/>
-            <a:r>
-              <a:rPr lang="en-GB" dirty="0" err="1"/>
-              <a:t>Sdf</a:t>
-            </a:r>
-            <a:endParaRPr lang="en-GB" dirty="0"/>
-          </a:p>
-          <a:p>
-            <a:r>
-              <a:rPr lang="en-GB" dirty="0" smtClean="0"/>
-              <a:t>Db Migrations</a:t>
-            </a:r>
-          </a:p>
-          <a:p>
-            <a:pPr lvl="1"/>
-            <a:r>
-              <a:rPr lang="en-GB" dirty="0" smtClean="0"/>
-              <a:t>Using the DB Migrator to generate SQL from Migration files</a:t>
-            </a:r>
-          </a:p>
-          <a:p>
-            <a:r>
-              <a:rPr lang="en-GB" dirty="0" smtClean="0"/>
-              <a:t>Entity caching</a:t>
-            </a:r>
-          </a:p>
-          <a:p>
-            <a:pPr lvl="1"/>
-            <a:endParaRPr lang="en-GB" dirty="0" smtClean="0"/>
           </a:p>
         </p:txBody>
       </p:sp>
@@ -10552,7 +10624,7 @@
     </p:spTree>
     <p:extLst>
       <p:ext uri="{BB962C8B-B14F-4D97-AF65-F5344CB8AC3E}">
-        <p14:creationId xmlns:p14="http://schemas.microsoft.com/office/powerpoint/2010/main" val="565120836"/>
+        <p14:creationId xmlns:p14="http://schemas.microsoft.com/office/powerpoint/2010/main" val="1485169999"/>
       </p:ext>
     </p:extLst>
   </p:cSld>
@@ -10599,169 +10671,6 @@
           <a:p>
             <a:r>
               <a:rPr lang="en-GB" dirty="0" smtClean="0"/>
-              <a:t>Entity Framework 6 New Features</a:t>
-            </a:r>
-            <a:endParaRPr lang="en-GB" dirty="0"/>
-          </a:p>
-        </p:txBody>
-      </p:sp>
-      <p:sp>
-        <p:nvSpPr>
-          <p:cNvPr id="3" name="Text Placeholder 2"/>
-          <p:cNvSpPr>
-            <a:spLocks noGrp="1"/>
-          </p:cNvSpPr>
-          <p:nvPr>
-            <p:ph type="body" sz="quarter" idx="11"/>
-          </p:nvPr>
-        </p:nvSpPr>
-        <p:spPr/>
-        <p:txBody>
-          <a:bodyPr/>
-          <a:lstStyle/>
-          <a:p>
-            <a:r>
-              <a:rPr lang="en-GB" dirty="0" smtClean="0"/>
-              <a:t>Asynchronous query and save</a:t>
-            </a:r>
-          </a:p>
-          <a:p>
-            <a:r>
-              <a:rPr lang="en-GB" dirty="0" smtClean="0"/>
-              <a:t>Connection resiliency</a:t>
-            </a:r>
-          </a:p>
-          <a:p>
-            <a:r>
-              <a:rPr lang="en-GB" dirty="0" smtClean="0"/>
-              <a:t>Code based configuration</a:t>
-            </a:r>
-          </a:p>
-          <a:p>
-            <a:r>
-              <a:rPr lang="en-GB" dirty="0" smtClean="0"/>
-              <a:t>Database command interception and logging</a:t>
-            </a:r>
-          </a:p>
-          <a:p>
-            <a:r>
-              <a:rPr lang="en-GB" dirty="0" smtClean="0"/>
-              <a:t>Code first CRUD stored procedures</a:t>
-            </a:r>
-          </a:p>
-          <a:p>
-            <a:r>
-              <a:rPr lang="en-GB" dirty="0" smtClean="0"/>
-              <a:t>Multiple contexts per database</a:t>
-            </a:r>
-          </a:p>
-          <a:p>
-            <a:r>
-              <a:rPr lang="en-GB" dirty="0" smtClean="0"/>
-              <a:t>Default transaction level for generated code first DB is now READ_COMMITTED_SNAPSHOT</a:t>
-            </a:r>
-          </a:p>
-          <a:p>
-            <a:r>
-              <a:rPr lang="en-GB" dirty="0" err="1" smtClean="0"/>
-              <a:t>Enums</a:t>
-            </a:r>
-            <a:r>
-              <a:rPr lang="en-GB" dirty="0" smtClean="0"/>
-              <a:t> and spatial support</a:t>
-            </a:r>
-          </a:p>
-          <a:p>
-            <a:r>
-              <a:rPr lang="en-GB" dirty="0" smtClean="0"/>
-              <a:t>Nested Entity Types</a:t>
-            </a:r>
-          </a:p>
-          <a:p>
-            <a:r>
-              <a:rPr lang="en-GB" dirty="0" smtClean="0"/>
-              <a:t>Support for a default Schema – </a:t>
-            </a:r>
-            <a:r>
-              <a:rPr lang="en-GB" dirty="0" err="1" smtClean="0"/>
-              <a:t>DBModelBuilder.HasDefaultSchema</a:t>
-            </a:r>
-            <a:endParaRPr lang="en-GB" dirty="0" smtClean="0"/>
-          </a:p>
-          <a:p>
-            <a:endParaRPr lang="en-GB" dirty="0"/>
-          </a:p>
-        </p:txBody>
-      </p:sp>
-      <p:sp>
-        <p:nvSpPr>
-          <p:cNvPr id="4" name="Text Placeholder 3"/>
-          <p:cNvSpPr>
-            <a:spLocks noGrp="1"/>
-          </p:cNvSpPr>
-          <p:nvPr>
-            <p:ph type="body" sz="quarter" idx="12"/>
-          </p:nvPr>
-        </p:nvSpPr>
-        <p:spPr/>
-        <p:txBody>
-          <a:bodyPr/>
-          <a:lstStyle/>
-          <a:p>
-            <a:endParaRPr lang="en-GB"/>
-          </a:p>
-        </p:txBody>
-      </p:sp>
-    </p:spTree>
-    <p:extLst>
-      <p:ext uri="{BB962C8B-B14F-4D97-AF65-F5344CB8AC3E}">
-        <p14:creationId xmlns:p14="http://schemas.microsoft.com/office/powerpoint/2010/main" val="1485169999"/>
-      </p:ext>
-    </p:extLst>
-  </p:cSld>
-  <p:clrMapOvr>
-    <a:masterClrMapping/>
-  </p:clrMapOvr>
-  <p:transition>
-    <p:fade/>
-  </p:transition>
-</p:sld>
-</file>
-
-<file path=ppt/slides/slide7.xml><?xml version="1.0" encoding="utf-8"?>
-<p:sld xmlns:a="http://schemas.openxmlformats.org/drawingml/2006/main" xmlns:r="http://schemas.openxmlformats.org/officeDocument/2006/relationships" xmlns:p="http://schemas.openxmlformats.org/presentationml/2006/main">
-  <p:cSld>
-    <p:spTree>
-      <p:nvGrpSpPr>
-        <p:cNvPr id="1" name=""/>
-        <p:cNvGrpSpPr/>
-        <p:nvPr/>
-      </p:nvGrpSpPr>
-      <p:grpSpPr>
-        <a:xfrm>
-          <a:off x="0" y="0"/>
-          <a:ext cx="0" cy="0"/>
-          <a:chOff x="0" y="0"/>
-          <a:chExt cx="0" cy="0"/>
-        </a:xfrm>
-      </p:grpSpPr>
-      <p:sp>
-        <p:nvSpPr>
-          <p:cNvPr id="2" name="Title 1"/>
-          <p:cNvSpPr>
-            <a:spLocks noGrp="1"/>
-          </p:cNvSpPr>
-          <p:nvPr>
-            <p:ph type="title"/>
-          </p:nvPr>
-        </p:nvSpPr>
-        <p:spPr/>
-        <p:txBody>
-          <a:bodyPr/>
-          <a:lstStyle/>
-          <a:p>
-            <a:r>
-              <a:rPr lang="en-GB" dirty="0" smtClean="0"/>
               <a:t>Header</a:t>
             </a:r>
             <a:endParaRPr lang="en-GB" dirty="0"/>
@@ -10853,7 +10762,7 @@
 </p:sld>
 </file>
 
-<file path=ppt/slides/slide8.xml><?xml version="1.0" encoding="utf-8"?>
+<file path=ppt/slides/slide7.xml><?xml version="1.0" encoding="utf-8"?>
 <p:sld xmlns:a="http://schemas.openxmlformats.org/drawingml/2006/main" xmlns:r="http://schemas.openxmlformats.org/officeDocument/2006/relationships" xmlns:p="http://schemas.openxmlformats.org/presentationml/2006/main">
   <p:cSld>
     <p:spTree>
@@ -11608,28 +11517,6 @@
 </file>
 
 <file path=customXml/item1.xml><?xml version="1.0" encoding="utf-8"?>
-<p:properties xmlns:p="http://schemas.microsoft.com/office/2006/metadata/properties" xmlns:xsi="http://www.w3.org/2001/XMLSchema-instance" xmlns:pc="http://schemas.microsoft.com/office/infopath/2007/PartnerControls">
-  <documentManagement>
-    <_dlc_DocId xmlns="3f10cd6e-67ef-4e06-a184-a118dcfc3794">NJN2WT7UW3MH-7-135</_dlc_DocId>
-    <_dlc_DocIdUrl xmlns="3f10cd6e-67ef-4e06-a184-a118dcfc3794">
-      <Url>http://gmt-teams/support/softdev/_layouts/DocIdRedir.aspx?ID=NJN2WT7UW3MH-7-135</Url>
-      <Description>NJN2WT7UW3MH-7-135</Description>
-    </_dlc_DocIdUrl>
-    <AverageRating xmlns="http://schemas.microsoft.com/sharepoint/v3" xsi:nil="true"/>
-  </documentManagement>
-</p:properties>
-</file>
-
-<file path=customXml/item2.xml><?xml version="1.0" encoding="utf-8"?>
-<?mso-contentType ?>
-<FormTemplates xmlns="http://schemas.microsoft.com/sharepoint/v3/contenttype/forms">
-  <Display>DocumentLibraryForm</Display>
-  <Edit>DocumentLibraryForm</Edit>
-  <New>DocumentLibraryForm</New>
-</FormTemplates>
-</file>
-
-<file path=customXml/item3.xml><?xml version="1.0" encoding="utf-8"?>
 <ct:contentTypeSchema xmlns:ct="http://schemas.microsoft.com/office/2006/metadata/contentType" xmlns:ma="http://schemas.microsoft.com/office/2006/metadata/properties/metaAttributes" ct:_="" ma:_="" ma:contentTypeName="Document" ma:contentTypeID="0x010100399A9BCA57566D4188E9CA16F86D6408" ma:contentTypeVersion="2" ma:contentTypeDescription="Create a new document." ma:contentTypeScope="" ma:versionID="290b8c847d18631d1d483ff51e5fcd5a">
   <xsd:schema xmlns:xsd="http://www.w3.org/2001/XMLSchema" xmlns:xs="http://www.w3.org/2001/XMLSchema" xmlns:p="http://schemas.microsoft.com/office/2006/metadata/properties" xmlns:ns1="http://schemas.microsoft.com/sharepoint/v3" xmlns:ns2="3f10cd6e-67ef-4e06-a184-a118dcfc3794" targetNamespace="http://schemas.microsoft.com/office/2006/metadata/properties" ma:root="true" ma:fieldsID="22722b2315d693ca6744ca36c727b733" ns1:_="" ns2:_="">
     <xsd:import namespace="http://schemas.microsoft.com/sharepoint/v3"/>
@@ -11791,6 +11678,28 @@
 </ct:contentTypeSchema>
 </file>
 
+<file path=customXml/item2.xml><?xml version="1.0" encoding="utf-8"?>
+<?mso-contentType ?>
+<FormTemplates xmlns="http://schemas.microsoft.com/sharepoint/v3/contenttype/forms">
+  <Display>DocumentLibraryForm</Display>
+  <Edit>DocumentLibraryForm</Edit>
+  <New>DocumentLibraryForm</New>
+</FormTemplates>
+</file>
+
+<file path=customXml/item3.xml><?xml version="1.0" encoding="utf-8"?>
+<p:properties xmlns:p="http://schemas.microsoft.com/office/2006/metadata/properties" xmlns:xsi="http://www.w3.org/2001/XMLSchema-instance" xmlns:pc="http://schemas.microsoft.com/office/infopath/2007/PartnerControls">
+  <documentManagement>
+    <_dlc_DocId xmlns="3f10cd6e-67ef-4e06-a184-a118dcfc3794">NJN2WT7UW3MH-7-135</_dlc_DocId>
+    <_dlc_DocIdUrl xmlns="3f10cd6e-67ef-4e06-a184-a118dcfc3794">
+      <Url>http://gmt-teams/support/softdev/_layouts/DocIdRedir.aspx?ID=NJN2WT7UW3MH-7-135</Url>
+      <Description>NJN2WT7UW3MH-7-135</Description>
+    </_dlc_DocIdUrl>
+    <AverageRating xmlns="http://schemas.microsoft.com/sharepoint/v3" xsi:nil="true"/>
+  </documentManagement>
+</p:properties>
+</file>
+
 <file path=customXml/item4.xml><?xml version="1.0" encoding="utf-8"?>
 <?mso-contentType ?>
 <spe:Receivers xmlns:spe="http://schemas.microsoft.com/sharepoint/events">
@@ -11838,25 +11747,6 @@
 </file>
 
 <file path=customXml/itemProps1.xml><?xml version="1.0" encoding="utf-8"?>
-<ds:datastoreItem xmlns:ds="http://schemas.openxmlformats.org/officeDocument/2006/customXml" ds:itemID="{2574B6B6-859E-4D47-B5B5-2F8A663167D3}">
-  <ds:schemaRefs>
-    <ds:schemaRef ds:uri="http://schemas.microsoft.com/office/2006/metadata/properties"/>
-    <ds:schemaRef ds:uri="http://schemas.microsoft.com/office/infopath/2007/PartnerControls"/>
-    <ds:schemaRef ds:uri="3f10cd6e-67ef-4e06-a184-a118dcfc3794"/>
-    <ds:schemaRef ds:uri="http://schemas.microsoft.com/sharepoint/v3"/>
-  </ds:schemaRefs>
-</ds:datastoreItem>
-</file>
-
-<file path=customXml/itemProps2.xml><?xml version="1.0" encoding="utf-8"?>
-<ds:datastoreItem xmlns:ds="http://schemas.openxmlformats.org/officeDocument/2006/customXml" ds:itemID="{D558CF23-FCB3-4D64-BEEA-3B9519B023D9}">
-  <ds:schemaRefs>
-    <ds:schemaRef ds:uri="http://schemas.microsoft.com/sharepoint/v3/contenttype/forms"/>
-  </ds:schemaRefs>
-</ds:datastoreItem>
-</file>
-
-<file path=customXml/itemProps3.xml><?xml version="1.0" encoding="utf-8"?>
 <ds:datastoreItem xmlns:ds="http://schemas.openxmlformats.org/officeDocument/2006/customXml" ds:itemID="{2E4AC93A-CA33-4EB8-84AE-434C71C0433B}">
   <ds:schemaRefs>
     <ds:schemaRef ds:uri="http://schemas.microsoft.com/office/2006/metadata/contentType"/>
@@ -11875,6 +11765,25 @@
 </ds:datastoreItem>
 </file>
 
+<file path=customXml/itemProps2.xml><?xml version="1.0" encoding="utf-8"?>
+<ds:datastoreItem xmlns:ds="http://schemas.openxmlformats.org/officeDocument/2006/customXml" ds:itemID="{D558CF23-FCB3-4D64-BEEA-3B9519B023D9}">
+  <ds:schemaRefs>
+    <ds:schemaRef ds:uri="http://schemas.microsoft.com/sharepoint/v3/contenttype/forms"/>
+  </ds:schemaRefs>
+</ds:datastoreItem>
+</file>
+
+<file path=customXml/itemProps3.xml><?xml version="1.0" encoding="utf-8"?>
+<ds:datastoreItem xmlns:ds="http://schemas.openxmlformats.org/officeDocument/2006/customXml" ds:itemID="{2574B6B6-859E-4D47-B5B5-2F8A663167D3}">
+  <ds:schemaRefs>
+    <ds:schemaRef ds:uri="http://schemas.microsoft.com/office/2006/metadata/properties"/>
+    <ds:schemaRef ds:uri="http://schemas.microsoft.com/office/infopath/2007/PartnerControls"/>
+    <ds:schemaRef ds:uri="3f10cd6e-67ef-4e06-a184-a118dcfc3794"/>
+    <ds:schemaRef ds:uri="http://schemas.microsoft.com/sharepoint/v3"/>
+  </ds:schemaRefs>
+</ds:datastoreItem>
+</file>
+
 <file path=customXml/itemProps4.xml><?xml version="1.0" encoding="utf-8"?>
 <ds:datastoreItem xmlns:ds="http://schemas.openxmlformats.org/officeDocument/2006/customXml" ds:itemID="{5BC4B29C-4555-46F6-A281-17873862A286}">
   <ds:schemaRefs>

</xml_diff>

<commit_message>
Added command interceptor and Full Text Db Migration operation
</commit_message>
<xml_diff>
--- a/20160128 Tech Punch - Entity Framework.pptx
+++ b/20160128 Tech Punch - Entity Framework.pptx
@@ -153,7 +153,7 @@
   </p:defaultTextStyle>
   <p:extLst>
     <p:ext uri="{EFAFB233-063F-42B5-8137-9DF3F51BA10A}">
-      <p15:sldGuideLst xmlns="" xmlns:p15="http://schemas.microsoft.com/office/powerpoint/2012/main">
+      <p15:sldGuideLst xmlns:p15="http://schemas.microsoft.com/office/powerpoint/2012/main" xmlns="">
         <p15:guide id="1" orient="horz" pos="335">
           <p15:clr>
             <a:srgbClr val="A4A3A4"/>
@@ -371,7 +371,7 @@
               <a:pPr>
                 <a:defRPr/>
               </a:pPr>
-              <a:t>16/01/2016</a:t>
+              <a:t>18/01/2016</a:t>
             </a:fld>
             <a:endParaRPr lang="en-GB" dirty="0"/>
           </a:p>
@@ -8915,7 +8915,7 @@
           <a:graphicData uri="http://schemas.openxmlformats.org/presentationml/2006/ole">
             <mc:AlternateContent xmlns:mc="http://schemas.openxmlformats.org/markup-compatibility/2006">
               <mc:Choice xmlns:v="urn:schemas-microsoft-com:vml" Requires="v">
-                <p:oleObj spid="_x0000_s2101" name="think-cell Slide" r:id="rId28" imgW="360" imgH="360" progId="">
+                <p:oleObj spid="_x0000_s2103" name="think-cell Slide" r:id="rId28" imgW="360" imgH="360" progId="">
                   <p:embed/>
                 </p:oleObj>
               </mc:Choice>
@@ -9891,7 +9891,11 @@
           <a:p>
             <a:r>
               <a:rPr lang="en-GB" dirty="0" smtClean="0"/>
-              <a:t>Entity Framework 6.1.3</a:t>
+              <a:t>Entity Framework </a:t>
+            </a:r>
+            <a:r>
+              <a:rPr lang="en-GB" dirty="0" smtClean="0"/>
+              <a:t>6</a:t>
             </a:r>
             <a:endParaRPr lang="en-GB" dirty="0"/>
           </a:p>
@@ -9934,6 +9938,60 @@
           </a:p>
         </p:txBody>
       </p:sp>
+      <p:pic>
+        <p:nvPicPr>
+          <p:cNvPr id="5" name="Picture 2"/>
+          <p:cNvPicPr>
+            <a:picLocks noChangeAspect="1" noChangeArrowheads="1"/>
+          </p:cNvPicPr>
+          <p:nvPr/>
+        </p:nvPicPr>
+        <p:blipFill>
+          <a:blip r:embed="rId2">
+            <a:extLst>
+              <a:ext uri="{28A0092B-C50C-407E-A947-70E740481C1C}">
+                <a14:useLocalDpi xmlns:a14="http://schemas.microsoft.com/office/drawing/2010/main" val="0"/>
+              </a:ext>
+            </a:extLst>
+          </a:blip>
+          <a:srcRect/>
+          <a:stretch>
+            <a:fillRect/>
+          </a:stretch>
+        </p:blipFill>
+        <p:spPr bwMode="auto">
+          <a:xfrm>
+            <a:off x="3437658" y="1709278"/>
+            <a:ext cx="6210300" cy="4010025"/>
+          </a:xfrm>
+          <a:prstGeom prst="rect">
+            <a:avLst/>
+          </a:prstGeom>
+          <a:noFill/>
+          <a:ln>
+            <a:noFill/>
+          </a:ln>
+          <a:extLst>
+            <a:ext uri="{909E8E84-426E-40DD-AFC4-6F175D3DCCD1}">
+              <a14:hiddenFill xmlns:a14="http://schemas.microsoft.com/office/drawing/2010/main">
+                <a:solidFill>
+                  <a:schemeClr val="accent1"/>
+                </a:solidFill>
+              </a14:hiddenFill>
+            </a:ext>
+            <a:ext uri="{91240B29-F687-4F45-9708-019B960494DF}">
+              <a14:hiddenLine xmlns:a14="http://schemas.microsoft.com/office/drawing/2010/main" w="9525">
+                <a:solidFill>
+                  <a:schemeClr val="tx1"/>
+                </a:solidFill>
+                <a:miter lim="800000"/>
+                <a:headEnd/>
+                <a:tailEnd/>
+              </a14:hiddenLine>
+            </a:ext>
+          </a:extLst>
+        </p:spPr>
+      </p:pic>
     </p:spTree>
   </p:cSld>
   <p:clrMapOvr>
@@ -10025,39 +10083,67 @@
             </a:r>
           </a:p>
           <a:p>
+            <a:r>
+              <a:rPr lang="en-GB" dirty="0" smtClean="0"/>
+              <a:t>Entity </a:t>
+            </a:r>
+            <a:r>
+              <a:rPr lang="en-GB" dirty="0" smtClean="0"/>
+              <a:t>Framework </a:t>
+            </a:r>
+            <a:r>
+              <a:rPr lang="en-GB" dirty="0" smtClean="0"/>
+              <a:t>6 Mind </a:t>
+            </a:r>
+            <a:r>
+              <a:rPr lang="en-GB" dirty="0" smtClean="0"/>
+              <a:t>Map</a:t>
+            </a:r>
+          </a:p>
+          <a:p>
+            <a:r>
+              <a:rPr lang="en-GB" dirty="0" smtClean="0"/>
+              <a:t>Entity </a:t>
+            </a:r>
+            <a:r>
+              <a:rPr lang="en-GB" dirty="0" smtClean="0"/>
+              <a:t>Framework 6 Performance </a:t>
+            </a:r>
+            <a:r>
+              <a:rPr lang="en-GB" dirty="0" smtClean="0"/>
+              <a:t>Tips</a:t>
+            </a:r>
+          </a:p>
+          <a:p>
+            <a:r>
+              <a:rPr lang="en-GB" dirty="0" smtClean="0"/>
+              <a:t>How to structure a project that makes use of Entity Framework</a:t>
+            </a:r>
+          </a:p>
+          <a:p>
             <a:pPr lvl="1"/>
             <a:r>
               <a:rPr lang="en-GB" dirty="0" smtClean="0"/>
-              <a:t>Entity Framework Code Base – Run Unit Test</a:t>
-            </a:r>
-            <a:endParaRPr lang="en-GB" dirty="0"/>
-          </a:p>
-          <a:p>
+              <a:t>Unit of Work Pattern</a:t>
+            </a:r>
+          </a:p>
+          <a:p>
+            <a:pPr lvl="1"/>
             <a:r>
               <a:rPr lang="en-GB" dirty="0" smtClean="0"/>
-              <a:t>Entity Framework 6.1.3 Feature Mind Map</a:t>
-            </a:r>
-          </a:p>
-          <a:p>
-            <a:r>
-              <a:rPr lang="en-GB" dirty="0" smtClean="0"/>
-              <a:t>Entity Framework 6+ New features</a:t>
-            </a:r>
-          </a:p>
-          <a:p>
-            <a:r>
-              <a:rPr lang="en-GB" dirty="0" smtClean="0"/>
-              <a:t>Entity Framework 6 Performance Tips</a:t>
-            </a:r>
-          </a:p>
-          <a:p>
+              <a:t>Repository Pattern</a:t>
+            </a:r>
+            <a:endParaRPr lang="en-GB" dirty="0" smtClean="0"/>
+          </a:p>
+          <a:p>
+            <a:pPr lvl="2"/>
             <a:r>
               <a:rPr lang="en-GB" dirty="0" smtClean="0"/>
               <a:t>Entity Framework Testing</a:t>
             </a:r>
           </a:p>
           <a:p>
-            <a:pPr lvl="1"/>
+            <a:pPr lvl="3"/>
             <a:r>
               <a:rPr lang="en-GB" dirty="0" smtClean="0"/>
               <a:t>How to Mock the </a:t>
@@ -10080,7 +10166,7 @@
             </a:r>
           </a:p>
           <a:p>
-            <a:pPr lvl="2"/>
+            <a:pPr lvl="4"/>
             <a:r>
               <a:rPr lang="en-GB" dirty="0" err="1" smtClean="0"/>
               <a:t>EntityFramework.Testing.Moq</a:t>
@@ -10088,7 +10174,7 @@
             <a:endParaRPr lang="en-GB" dirty="0"/>
           </a:p>
           <a:p>
-            <a:pPr lvl="2"/>
+            <a:pPr lvl="4"/>
             <a:r>
               <a:rPr lang="en-GB" dirty="0" err="1" smtClean="0"/>
               <a:t>EntityFramework.Testing</a:t>
@@ -10098,20 +10184,11 @@
           <a:p>
             <a:r>
               <a:rPr lang="en-GB" dirty="0" smtClean="0"/>
-              <a:t>Adventure Works Demo Sample : - </a:t>
-            </a:r>
-          </a:p>
-          <a:p>
-            <a:pPr lvl="1"/>
+              <a:t>What’s </a:t>
+            </a:r>
             <a:r>
               <a:rPr lang="en-GB" dirty="0" smtClean="0"/>
-              <a:t>How to structure an EF project so that it uses the Repository Pattern and Unit of Work</a:t>
-            </a:r>
-          </a:p>
-          <a:p>
-            <a:r>
-              <a:rPr lang="en-GB" dirty="0" smtClean="0"/>
-              <a:t>What’s in Entity Framework 7</a:t>
+              <a:t>in Entity Framework 7</a:t>
             </a:r>
           </a:p>
           <a:p>
@@ -10231,60 +10308,6 @@
           </a:p>
         </p:txBody>
       </p:sp>
-      <p:pic>
-        <p:nvPicPr>
-          <p:cNvPr id="3074" name="Picture 2"/>
-          <p:cNvPicPr>
-            <a:picLocks noChangeAspect="1" noChangeArrowheads="1"/>
-          </p:cNvPicPr>
-          <p:nvPr/>
-        </p:nvPicPr>
-        <p:blipFill>
-          <a:blip r:embed="rId2">
-            <a:extLst>
-              <a:ext uri="{28A0092B-C50C-407E-A947-70E740481C1C}">
-                <a14:useLocalDpi xmlns:a14="http://schemas.microsoft.com/office/drawing/2010/main" val="0"/>
-              </a:ext>
-            </a:extLst>
-          </a:blip>
-          <a:srcRect/>
-          <a:stretch>
-            <a:fillRect/>
-          </a:stretch>
-        </p:blipFill>
-        <p:spPr bwMode="auto">
-          <a:xfrm>
-            <a:off x="1847850" y="1423988"/>
-            <a:ext cx="6210300" cy="4010025"/>
-          </a:xfrm>
-          <a:prstGeom prst="rect">
-            <a:avLst/>
-          </a:prstGeom>
-          <a:noFill/>
-          <a:ln>
-            <a:noFill/>
-          </a:ln>
-          <a:extLst>
-            <a:ext uri="{909E8E84-426E-40DD-AFC4-6F175D3DCCD1}">
-              <a14:hiddenFill xmlns:a14="http://schemas.microsoft.com/office/drawing/2010/main">
-                <a:solidFill>
-                  <a:schemeClr val="accent1"/>
-                </a:solidFill>
-              </a14:hiddenFill>
-            </a:ext>
-            <a:ext uri="{91240B29-F687-4F45-9708-019B960494DF}">
-              <a14:hiddenLine xmlns:a14="http://schemas.microsoft.com/office/drawing/2010/main" w="9525">
-                <a:solidFill>
-                  <a:schemeClr val="tx1"/>
-                </a:solidFill>
-                <a:miter lim="800000"/>
-                <a:headEnd/>
-                <a:tailEnd/>
-              </a14:hiddenLine>
-            </a:ext>
-          </a:extLst>
-        </p:spPr>
-      </p:pic>
     </p:spTree>
     <p:extLst>
       <p:ext uri="{BB962C8B-B14F-4D97-AF65-F5344CB8AC3E}">
@@ -10335,7 +10358,15 @@
           <a:p>
             <a:r>
               <a:rPr lang="en-GB" dirty="0"/>
-              <a:t>Entity Framework 6.1.1 Feature Mind Map</a:t>
+              <a:t>Entity Framework </a:t>
+            </a:r>
+            <a:r>
+              <a:rPr lang="en-GB" dirty="0" smtClean="0"/>
+              <a:t>6 </a:t>
+            </a:r>
+            <a:r>
+              <a:rPr lang="en-GB" dirty="0"/>
+              <a:t>Feature Mind Map</a:t>
             </a:r>
           </a:p>
         </p:txBody>
@@ -10356,10 +10387,6 @@
           <a:lstStyle/>
           <a:p>
             <a:r>
-              <a:rPr lang="en-GB" dirty="0" smtClean="0"/>
-              <a:t>Entity framework </a:t>
-            </a:r>
-            <a:r>
               <a:rPr lang="en-GB" dirty="0" err="1" smtClean="0"/>
               <a:t>Linq</a:t>
             </a:r>
@@ -10369,10 +10396,23 @@
             </a:r>
           </a:p>
           <a:p>
+            <a:r>
+              <a:rPr lang="en-GB" dirty="0" smtClean="0"/>
+              <a:t>Change Tracker</a:t>
+            </a:r>
+          </a:p>
+          <a:p>
+            <a:endParaRPr lang="en-GB" dirty="0" smtClean="0"/>
+          </a:p>
+          <a:p>
             <a:pPr lvl="1"/>
             <a:r>
               <a:rPr lang="en-GB" dirty="0" smtClean="0"/>
-              <a:t>Lazy vs Eager loading of entities</a:t>
+              <a:t>Lazy </a:t>
+            </a:r>
+            <a:r>
+              <a:rPr lang="en-GB" dirty="0" smtClean="0"/>
+              <a:t>vs Eager loading of entities</a:t>
             </a:r>
           </a:p>
           <a:p>
@@ -10524,7 +10564,12 @@
             <p:ph type="body" sz="quarter" idx="11"/>
           </p:nvPr>
         </p:nvSpPr>
-        <p:spPr/>
+        <p:spPr>
+          <a:xfrm>
+            <a:off x="412883" y="1083302"/>
+            <a:ext cx="9073222" cy="4901896"/>
+          </a:xfrm>
+        </p:spPr>
         <p:txBody>
           <a:bodyPr/>
           <a:lstStyle/>
@@ -10595,6 +10640,27 @@
               <a:rPr lang="en-GB" dirty="0" err="1" smtClean="0"/>
               <a:t>DBModelBuilder.HasDefaultSchema</a:t>
             </a:r>
+            <a:endParaRPr lang="en-GB" dirty="0" smtClean="0"/>
+          </a:p>
+          <a:p>
+            <a:r>
+              <a:rPr lang="en-GB" dirty="0" smtClean="0"/>
+              <a:t>Configurable migrations history table</a:t>
+            </a:r>
+          </a:p>
+          <a:p>
+            <a:r>
+              <a:rPr lang="en-GB" dirty="0" smtClean="0"/>
+              <a:t>Creating context with an open connection</a:t>
+            </a:r>
+          </a:p>
+          <a:p>
+            <a:r>
+              <a:rPr lang="en-GB" dirty="0" smtClean="0"/>
+              <a:t>Improved transaction support</a:t>
+            </a:r>
+          </a:p>
+          <a:p>
             <a:endParaRPr lang="en-GB" dirty="0" smtClean="0"/>
           </a:p>
           <a:p>
@@ -11517,6 +11583,28 @@
 </file>
 
 <file path=customXml/item1.xml><?xml version="1.0" encoding="utf-8"?>
+<p:properties xmlns:p="http://schemas.microsoft.com/office/2006/metadata/properties" xmlns:xsi="http://www.w3.org/2001/XMLSchema-instance" xmlns:pc="http://schemas.microsoft.com/office/infopath/2007/PartnerControls">
+  <documentManagement>
+    <_dlc_DocId xmlns="3f10cd6e-67ef-4e06-a184-a118dcfc3794">NJN2WT7UW3MH-7-135</_dlc_DocId>
+    <_dlc_DocIdUrl xmlns="3f10cd6e-67ef-4e06-a184-a118dcfc3794">
+      <Url>http://gmt-teams/support/softdev/_layouts/DocIdRedir.aspx?ID=NJN2WT7UW3MH-7-135</Url>
+      <Description>NJN2WT7UW3MH-7-135</Description>
+    </_dlc_DocIdUrl>
+    <AverageRating xmlns="http://schemas.microsoft.com/sharepoint/v3" xsi:nil="true"/>
+  </documentManagement>
+</p:properties>
+</file>
+
+<file path=customXml/item2.xml><?xml version="1.0" encoding="utf-8"?>
+<?mso-contentType ?>
+<FormTemplates xmlns="http://schemas.microsoft.com/sharepoint/v3/contenttype/forms">
+  <Display>DocumentLibraryForm</Display>
+  <Edit>DocumentLibraryForm</Edit>
+  <New>DocumentLibraryForm</New>
+</FormTemplates>
+</file>
+
+<file path=customXml/item3.xml><?xml version="1.0" encoding="utf-8"?>
 <ct:contentTypeSchema xmlns:ct="http://schemas.microsoft.com/office/2006/metadata/contentType" xmlns:ma="http://schemas.microsoft.com/office/2006/metadata/properties/metaAttributes" ct:_="" ma:_="" ma:contentTypeName="Document" ma:contentTypeID="0x010100399A9BCA57566D4188E9CA16F86D6408" ma:contentTypeVersion="2" ma:contentTypeDescription="Create a new document." ma:contentTypeScope="" ma:versionID="290b8c847d18631d1d483ff51e5fcd5a">
   <xsd:schema xmlns:xsd="http://www.w3.org/2001/XMLSchema" xmlns:xs="http://www.w3.org/2001/XMLSchema" xmlns:p="http://schemas.microsoft.com/office/2006/metadata/properties" xmlns:ns1="http://schemas.microsoft.com/sharepoint/v3" xmlns:ns2="3f10cd6e-67ef-4e06-a184-a118dcfc3794" targetNamespace="http://schemas.microsoft.com/office/2006/metadata/properties" ma:root="true" ma:fieldsID="22722b2315d693ca6744ca36c727b733" ns1:_="" ns2:_="">
     <xsd:import namespace="http://schemas.microsoft.com/sharepoint/v3"/>
@@ -11678,28 +11766,6 @@
 </ct:contentTypeSchema>
 </file>
 
-<file path=customXml/item2.xml><?xml version="1.0" encoding="utf-8"?>
-<?mso-contentType ?>
-<FormTemplates xmlns="http://schemas.microsoft.com/sharepoint/v3/contenttype/forms">
-  <Display>DocumentLibraryForm</Display>
-  <Edit>DocumentLibraryForm</Edit>
-  <New>DocumentLibraryForm</New>
-</FormTemplates>
-</file>
-
-<file path=customXml/item3.xml><?xml version="1.0" encoding="utf-8"?>
-<p:properties xmlns:p="http://schemas.microsoft.com/office/2006/metadata/properties" xmlns:xsi="http://www.w3.org/2001/XMLSchema-instance" xmlns:pc="http://schemas.microsoft.com/office/infopath/2007/PartnerControls">
-  <documentManagement>
-    <_dlc_DocId xmlns="3f10cd6e-67ef-4e06-a184-a118dcfc3794">NJN2WT7UW3MH-7-135</_dlc_DocId>
-    <_dlc_DocIdUrl xmlns="3f10cd6e-67ef-4e06-a184-a118dcfc3794">
-      <Url>http://gmt-teams/support/softdev/_layouts/DocIdRedir.aspx?ID=NJN2WT7UW3MH-7-135</Url>
-      <Description>NJN2WT7UW3MH-7-135</Description>
-    </_dlc_DocIdUrl>
-    <AverageRating xmlns="http://schemas.microsoft.com/sharepoint/v3" xsi:nil="true"/>
-  </documentManagement>
-</p:properties>
-</file>
-
 <file path=customXml/item4.xml><?xml version="1.0" encoding="utf-8"?>
 <?mso-contentType ?>
 <spe:Receivers xmlns:spe="http://schemas.microsoft.com/sharepoint/events">
@@ -11747,6 +11813,25 @@
 </file>
 
 <file path=customXml/itemProps1.xml><?xml version="1.0" encoding="utf-8"?>
+<ds:datastoreItem xmlns:ds="http://schemas.openxmlformats.org/officeDocument/2006/customXml" ds:itemID="{2574B6B6-859E-4D47-B5B5-2F8A663167D3}">
+  <ds:schemaRefs>
+    <ds:schemaRef ds:uri="http://schemas.microsoft.com/office/2006/metadata/properties"/>
+    <ds:schemaRef ds:uri="http://schemas.microsoft.com/office/infopath/2007/PartnerControls"/>
+    <ds:schemaRef ds:uri="3f10cd6e-67ef-4e06-a184-a118dcfc3794"/>
+    <ds:schemaRef ds:uri="http://schemas.microsoft.com/sharepoint/v3"/>
+  </ds:schemaRefs>
+</ds:datastoreItem>
+</file>
+
+<file path=customXml/itemProps2.xml><?xml version="1.0" encoding="utf-8"?>
+<ds:datastoreItem xmlns:ds="http://schemas.openxmlformats.org/officeDocument/2006/customXml" ds:itemID="{D558CF23-FCB3-4D64-BEEA-3B9519B023D9}">
+  <ds:schemaRefs>
+    <ds:schemaRef ds:uri="http://schemas.microsoft.com/sharepoint/v3/contenttype/forms"/>
+  </ds:schemaRefs>
+</ds:datastoreItem>
+</file>
+
+<file path=customXml/itemProps3.xml><?xml version="1.0" encoding="utf-8"?>
 <ds:datastoreItem xmlns:ds="http://schemas.openxmlformats.org/officeDocument/2006/customXml" ds:itemID="{2E4AC93A-CA33-4EB8-84AE-434C71C0433B}">
   <ds:schemaRefs>
     <ds:schemaRef ds:uri="http://schemas.microsoft.com/office/2006/metadata/contentType"/>
@@ -11765,25 +11850,6 @@
 </ds:datastoreItem>
 </file>
 
-<file path=customXml/itemProps2.xml><?xml version="1.0" encoding="utf-8"?>
-<ds:datastoreItem xmlns:ds="http://schemas.openxmlformats.org/officeDocument/2006/customXml" ds:itemID="{D558CF23-FCB3-4D64-BEEA-3B9519B023D9}">
-  <ds:schemaRefs>
-    <ds:schemaRef ds:uri="http://schemas.microsoft.com/sharepoint/v3/contenttype/forms"/>
-  </ds:schemaRefs>
-</ds:datastoreItem>
-</file>
-
-<file path=customXml/itemProps3.xml><?xml version="1.0" encoding="utf-8"?>
-<ds:datastoreItem xmlns:ds="http://schemas.openxmlformats.org/officeDocument/2006/customXml" ds:itemID="{2574B6B6-859E-4D47-B5B5-2F8A663167D3}">
-  <ds:schemaRefs>
-    <ds:schemaRef ds:uri="http://schemas.microsoft.com/office/2006/metadata/properties"/>
-    <ds:schemaRef ds:uri="http://schemas.microsoft.com/office/infopath/2007/PartnerControls"/>
-    <ds:schemaRef ds:uri="3f10cd6e-67ef-4e06-a184-a118dcfc3794"/>
-    <ds:schemaRef ds:uri="http://schemas.microsoft.com/sharepoint/v3"/>
-  </ds:schemaRefs>
-</ds:datastoreItem>
-</file>
-
 <file path=customXml/itemProps4.xml><?xml version="1.0" encoding="utf-8"?>
 <ds:datastoreItem xmlns:ds="http://schemas.openxmlformats.org/officeDocument/2006/customXml" ds:itemID="{5BC4B29C-4555-46F6-A281-17873862A286}">
   <ds:schemaRefs>

</xml_diff>

<commit_message>
Unit Test Work - Performance Test Cleanup - ALPHA
</commit_message>
<xml_diff>
--- a/20160128 Tech Punch - Entity Framework.pptx
+++ b/20160128 Tech Punch - Entity Framework.pptx
@@ -11,8 +11,8 @@
     <p:sldId id="326" r:id="rId6"/>
     <p:sldId id="325" r:id="rId7"/>
     <p:sldId id="327" r:id="rId8"/>
-    <p:sldId id="329" r:id="rId9"/>
-    <p:sldId id="330" r:id="rId10"/>
+    <p:sldId id="330" r:id="rId9"/>
+    <p:sldId id="329" r:id="rId10"/>
     <p:sldId id="345" r:id="rId11"/>
   </p:sldIdLst>
   <p:sldSz cx="9906000" cy="6858000" type="A4"/>
@@ -152,7 +152,7 @@
   </p:defaultTextStyle>
   <p:extLst>
     <p:ext uri="{EFAFB233-063F-42B5-8137-9DF3F51BA10A}">
-      <p15:sldGuideLst xmlns="" xmlns:p15="http://schemas.microsoft.com/office/powerpoint/2012/main">
+      <p15:sldGuideLst xmlns:p15="http://schemas.microsoft.com/office/powerpoint/2012/main" xmlns="">
         <p15:guide id="1" orient="horz" pos="335">
           <p15:clr>
             <a:srgbClr val="A4A3A4"/>
@@ -370,7 +370,7 @@
               <a:pPr>
                 <a:defRPr/>
               </a:pPr>
-              <a:t>22/01/2016</a:t>
+              <a:t>23/01/2016</a:t>
             </a:fld>
             <a:endParaRPr lang="en-GB" dirty="0"/>
           </a:p>
@@ -8914,7 +8914,7 @@
           <a:graphicData uri="http://schemas.openxmlformats.org/presentationml/2006/ole">
             <mc:AlternateContent xmlns:mc="http://schemas.openxmlformats.org/markup-compatibility/2006">
               <mc:Choice xmlns:v="urn:schemas-microsoft-com:vml" Requires="v">
-                <p:oleObj spid="_x0000_s2105" name="think-cell Slide" r:id="rId28" imgW="360" imgH="360" progId="">
+                <p:oleObj spid="_x0000_s2107" name="think-cell Slide" r:id="rId28" imgW="360" imgH="360" progId="">
                   <p:embed/>
                 </p:oleObj>
               </mc:Choice>
@@ -10026,19 +10026,11 @@
           <a:p>
             <a:r>
               <a:rPr lang="en-GB" sz="1800" dirty="0" smtClean="0"/>
-              <a:t>Entity Framework 6 Mind Map</a:t>
-            </a:r>
-          </a:p>
-          <a:p>
+              <a:t>How </a:t>
+            </a:r>
             <a:r>
               <a:rPr lang="en-GB" sz="1800" dirty="0" smtClean="0"/>
-              <a:t>Entity Framework 6 Performance Tips</a:t>
-            </a:r>
-          </a:p>
-          <a:p>
-            <a:r>
-              <a:rPr lang="en-GB" sz="1800" dirty="0" smtClean="0"/>
-              <a:t>How to structure a project that makes use of Entity Framework</a:t>
+              <a:t>to structure a project that makes use of Entity Framework</a:t>
             </a:r>
           </a:p>
           <a:p>
@@ -10052,22 +10044,14 @@
             <a:pPr lvl="3"/>
             <a:r>
               <a:rPr lang="en-GB" sz="1600" dirty="0" smtClean="0"/>
-              <a:t>Repository </a:t>
-            </a:r>
-            <a:r>
-              <a:rPr lang="en-GB" sz="1600" dirty="0" smtClean="0"/>
-              <a:t>Pattern</a:t>
+              <a:t>Repository Pattern</a:t>
             </a:r>
           </a:p>
           <a:p>
             <a:pPr lvl="2"/>
             <a:r>
               <a:rPr lang="en-GB" sz="1800" dirty="0" smtClean="0"/>
-              <a:t>Entity </a:t>
-            </a:r>
-            <a:r>
-              <a:rPr lang="en-GB" sz="1800" dirty="0" smtClean="0"/>
-              <a:t>Framework Testing</a:t>
+              <a:t>Entity Framework Testing</a:t>
             </a:r>
           </a:p>
           <a:p>
@@ -10085,12 +10069,20 @@
               <a:t> – See </a:t>
             </a:r>
             <a:r>
+              <a:rPr lang="en-GB" sz="1800" dirty="0" smtClean="0"/>
+              <a:t>Pre-Release </a:t>
+            </a:r>
+            <a:r>
               <a:rPr lang="en-GB" sz="1800" dirty="0" err="1" smtClean="0"/>
               <a:t>Nuget</a:t>
             </a:r>
             <a:r>
               <a:rPr lang="en-GB" sz="1800" dirty="0" smtClean="0"/>
-              <a:t> Packages</a:t>
+              <a:t> </a:t>
+            </a:r>
+            <a:r>
+              <a:rPr lang="en-GB" sz="1800" dirty="0" smtClean="0"/>
+              <a:t>Packages</a:t>
             </a:r>
           </a:p>
           <a:p>
@@ -10111,8 +10103,18 @@
           </a:p>
           <a:p>
             <a:r>
+              <a:rPr lang="en-GB" sz="1800" dirty="0"/>
+              <a:t>Entity Framework 6 Performance Tips</a:t>
+            </a:r>
+          </a:p>
+          <a:p>
+            <a:r>
               <a:rPr lang="en-GB" sz="1800" dirty="0" smtClean="0"/>
-              <a:t>What’s in Entity Framework 7</a:t>
+              <a:t>What’s </a:t>
+            </a:r>
+            <a:r>
+              <a:rPr lang="en-GB" sz="1800" dirty="0" smtClean="0"/>
+              <a:t>in Entity Framework 7</a:t>
             </a:r>
           </a:p>
           <a:p>
@@ -10661,7 +10663,7 @@
           <a:p>
             <a:r>
               <a:rPr lang="en-GB" dirty="0" smtClean="0"/>
-              <a:t>Entity Framework 6 New Features</a:t>
+              <a:t>Header</a:t>
             </a:r>
             <a:endParaRPr lang="en-GB" dirty="0"/>
           </a:p>
@@ -10677,106 +10679,42 @@
             <p:ph type="body" sz="quarter" idx="11"/>
           </p:nvPr>
         </p:nvSpPr>
-        <p:spPr>
-          <a:xfrm>
-            <a:off x="412883" y="1083302"/>
-            <a:ext cx="9073222" cy="4901896"/>
-          </a:xfrm>
-        </p:spPr>
+        <p:spPr/>
         <p:txBody>
           <a:bodyPr/>
           <a:lstStyle/>
           <a:p>
             <a:r>
-              <a:rPr lang="en-GB" dirty="0" smtClean="0"/>
-              <a:t>Asynchronous query and save</a:t>
-            </a:r>
-          </a:p>
-          <a:p>
-            <a:r>
-              <a:rPr lang="en-GB" dirty="0" smtClean="0"/>
-              <a:t>Connection resiliency</a:t>
-            </a:r>
-          </a:p>
-          <a:p>
-            <a:r>
-              <a:rPr lang="en-GB" dirty="0" smtClean="0"/>
-              <a:t>Code based configuration</a:t>
-            </a:r>
-          </a:p>
-          <a:p>
-            <a:r>
-              <a:rPr lang="en-GB" dirty="0" smtClean="0"/>
-              <a:t>Database command interception and logging</a:t>
-            </a:r>
-          </a:p>
-          <a:p>
-            <a:r>
-              <a:rPr lang="en-GB" dirty="0" smtClean="0"/>
-              <a:t>Code first CRUD stored procedures</a:t>
-            </a:r>
-          </a:p>
-          <a:p>
-            <a:r>
-              <a:rPr lang="en-GB" dirty="0" smtClean="0"/>
-              <a:t>Multiple contexts per database</a:t>
-            </a:r>
-          </a:p>
-          <a:p>
-            <a:r>
-              <a:rPr lang="en-GB" dirty="0" smtClean="0"/>
-              <a:t>Default transaction level for generated code first DB is now READ_COMMITTED_SNAPSHOT</a:t>
-            </a:r>
-          </a:p>
-          <a:p>
-            <a:r>
               <a:rPr lang="en-GB" dirty="0" err="1" smtClean="0"/>
-              <a:t>Enums</a:t>
-            </a:r>
-            <a:r>
-              <a:rPr lang="en-GB" dirty="0" smtClean="0"/>
-              <a:t> and spatial support</a:t>
-            </a:r>
-          </a:p>
-          <a:p>
-            <a:r>
-              <a:rPr lang="en-GB" dirty="0" smtClean="0"/>
-              <a:t>Nested Entity Types</a:t>
-            </a:r>
-          </a:p>
-          <a:p>
-            <a:r>
-              <a:rPr lang="en-GB" dirty="0" smtClean="0"/>
-              <a:t>Support for a default Schema – </a:t>
-            </a:r>
-            <a:r>
-              <a:rPr lang="en-GB" dirty="0" err="1" smtClean="0"/>
-              <a:t>DBModelBuilder.HasDefaultSchema</a:t>
+              <a:t>sadsd</a:t>
             </a:r>
             <a:endParaRPr lang="en-GB" dirty="0" smtClean="0"/>
           </a:p>
           <a:p>
-            <a:r>
-              <a:rPr lang="en-GB" dirty="0" smtClean="0"/>
-              <a:t>Configurable migrations history table</a:t>
-            </a:r>
-          </a:p>
-          <a:p>
-            <a:r>
-              <a:rPr lang="en-GB" dirty="0" smtClean="0"/>
-              <a:t>Creating context with an open connection</a:t>
-            </a:r>
-          </a:p>
-          <a:p>
-            <a:r>
-              <a:rPr lang="en-GB" dirty="0" smtClean="0"/>
-              <a:t>Improved transaction support</a:t>
-            </a:r>
-          </a:p>
-          <a:p>
+            <a:pPr marL="90000" indent="0">
+              <a:buNone/>
+            </a:pPr>
             <a:endParaRPr lang="en-GB" dirty="0" smtClean="0"/>
           </a:p>
           <a:p>
+            <a:pPr>
+              <a:buFont typeface="Arial" panose="020B0604020202020204" pitchFamily="34" charset="0"/>
+              <a:buChar char="•"/>
+            </a:pPr>
+            <a:r>
+              <a:rPr lang="en-US" dirty="0" smtClean="0"/>
+              <a:t>1</a:t>
+            </a:r>
+          </a:p>
+          <a:p>
+            <a:pPr>
+              <a:buFont typeface="Arial" panose="020B0604020202020204" pitchFamily="34" charset="0"/>
+              <a:buChar char="•"/>
+            </a:pPr>
+            <a:r>
+              <a:rPr lang="en-US" i="1" dirty="0" smtClean="0"/>
+              <a:t>2</a:t>
+            </a:r>
             <a:endParaRPr lang="en-GB" dirty="0"/>
           </a:p>
         </p:txBody>
@@ -10803,7 +10741,7 @@
     </p:spTree>
     <p:extLst>
       <p:ext uri="{BB962C8B-B14F-4D97-AF65-F5344CB8AC3E}">
-        <p14:creationId xmlns:p14="http://schemas.microsoft.com/office/powerpoint/2010/main" val="1485169999"/>
+        <p14:creationId xmlns:p14="http://schemas.microsoft.com/office/powerpoint/2010/main" val="1723364015"/>
       </p:ext>
     </p:extLst>
   </p:cSld>
@@ -10850,7 +10788,7 @@
           <a:p>
             <a:r>
               <a:rPr lang="en-GB" dirty="0" smtClean="0"/>
-              <a:t>Header</a:t>
+              <a:t>Entity Framework 6 New Features</a:t>
             </a:r>
             <a:endParaRPr lang="en-GB" dirty="0"/>
           </a:p>
@@ -10866,42 +10804,106 @@
             <p:ph type="body" sz="quarter" idx="11"/>
           </p:nvPr>
         </p:nvSpPr>
-        <p:spPr/>
+        <p:spPr>
+          <a:xfrm>
+            <a:off x="412883" y="1083302"/>
+            <a:ext cx="9073222" cy="4901896"/>
+          </a:xfrm>
+        </p:spPr>
         <p:txBody>
           <a:bodyPr/>
           <a:lstStyle/>
           <a:p>
             <a:r>
+              <a:rPr lang="en-GB" dirty="0" smtClean="0"/>
+              <a:t>Asynchronous query and save</a:t>
+            </a:r>
+          </a:p>
+          <a:p>
+            <a:r>
+              <a:rPr lang="en-GB" dirty="0" smtClean="0"/>
+              <a:t>Connection resiliency</a:t>
+            </a:r>
+          </a:p>
+          <a:p>
+            <a:r>
+              <a:rPr lang="en-GB" dirty="0" smtClean="0"/>
+              <a:t>Code based configuration</a:t>
+            </a:r>
+          </a:p>
+          <a:p>
+            <a:r>
+              <a:rPr lang="en-GB" dirty="0" smtClean="0"/>
+              <a:t>Database command interception and logging</a:t>
+            </a:r>
+          </a:p>
+          <a:p>
+            <a:r>
+              <a:rPr lang="en-GB" dirty="0" smtClean="0"/>
+              <a:t>Code first CRUD stored procedures</a:t>
+            </a:r>
+          </a:p>
+          <a:p>
+            <a:r>
+              <a:rPr lang="en-GB" dirty="0" smtClean="0"/>
+              <a:t>Multiple contexts per database</a:t>
+            </a:r>
+          </a:p>
+          <a:p>
+            <a:r>
+              <a:rPr lang="en-GB" dirty="0" smtClean="0"/>
+              <a:t>Default transaction level for generated code first DB is now READ_COMMITTED_SNAPSHOT</a:t>
+            </a:r>
+          </a:p>
+          <a:p>
+            <a:r>
               <a:rPr lang="en-GB" dirty="0" err="1" smtClean="0"/>
-              <a:t>sadsd</a:t>
+              <a:t>Enums</a:t>
+            </a:r>
+            <a:r>
+              <a:rPr lang="en-GB" dirty="0" smtClean="0"/>
+              <a:t> and spatial support</a:t>
+            </a:r>
+          </a:p>
+          <a:p>
+            <a:r>
+              <a:rPr lang="en-GB" dirty="0" smtClean="0"/>
+              <a:t>Nested Entity Types</a:t>
+            </a:r>
+          </a:p>
+          <a:p>
+            <a:r>
+              <a:rPr lang="en-GB" dirty="0" smtClean="0"/>
+              <a:t>Support for a default Schema – </a:t>
+            </a:r>
+            <a:r>
+              <a:rPr lang="en-GB" dirty="0" err="1" smtClean="0"/>
+              <a:t>DBModelBuilder.HasDefaultSchema</a:t>
             </a:r>
             <a:endParaRPr lang="en-GB" dirty="0" smtClean="0"/>
           </a:p>
           <a:p>
-            <a:pPr marL="90000" indent="0">
-              <a:buNone/>
-            </a:pPr>
+            <a:r>
+              <a:rPr lang="en-GB" dirty="0" smtClean="0"/>
+              <a:t>Configurable migrations history table</a:t>
+            </a:r>
+          </a:p>
+          <a:p>
+            <a:r>
+              <a:rPr lang="en-GB" dirty="0" smtClean="0"/>
+              <a:t>Creating context with an open connection</a:t>
+            </a:r>
+          </a:p>
+          <a:p>
+            <a:r>
+              <a:rPr lang="en-GB" dirty="0" smtClean="0"/>
+              <a:t>Improved transaction support</a:t>
+            </a:r>
+          </a:p>
+          <a:p>
             <a:endParaRPr lang="en-GB" dirty="0" smtClean="0"/>
           </a:p>
           <a:p>
-            <a:pPr>
-              <a:buFont typeface="Arial" panose="020B0604020202020204" pitchFamily="34" charset="0"/>
-              <a:buChar char="•"/>
-            </a:pPr>
-            <a:r>
-              <a:rPr lang="en-US" dirty="0" smtClean="0"/>
-              <a:t>1</a:t>
-            </a:r>
-          </a:p>
-          <a:p>
-            <a:pPr>
-              <a:buFont typeface="Arial" panose="020B0604020202020204" pitchFamily="34" charset="0"/>
-              <a:buChar char="•"/>
-            </a:pPr>
-            <a:r>
-              <a:rPr lang="en-US" i="1" dirty="0" smtClean="0"/>
-              <a:t>2</a:t>
-            </a:r>
             <a:endParaRPr lang="en-GB" dirty="0"/>
           </a:p>
         </p:txBody>
@@ -10928,7 +10930,7 @@
     </p:spTree>
     <p:extLst>
       <p:ext uri="{BB962C8B-B14F-4D97-AF65-F5344CB8AC3E}">
-        <p14:creationId xmlns:p14="http://schemas.microsoft.com/office/powerpoint/2010/main" val="1723364015"/>
+        <p14:creationId xmlns:p14="http://schemas.microsoft.com/office/powerpoint/2010/main" val="1485169999"/>
       </p:ext>
     </p:extLst>
   </p:cSld>
@@ -11696,6 +11698,28 @@
 </file>
 
 <file path=customXml/item1.xml><?xml version="1.0" encoding="utf-8"?>
+<p:properties xmlns:p="http://schemas.microsoft.com/office/2006/metadata/properties" xmlns:xsi="http://www.w3.org/2001/XMLSchema-instance" xmlns:pc="http://schemas.microsoft.com/office/infopath/2007/PartnerControls">
+  <documentManagement>
+    <_dlc_DocId xmlns="3f10cd6e-67ef-4e06-a184-a118dcfc3794">NJN2WT7UW3MH-7-135</_dlc_DocId>
+    <_dlc_DocIdUrl xmlns="3f10cd6e-67ef-4e06-a184-a118dcfc3794">
+      <Url>http://gmt-teams/support/softdev/_layouts/DocIdRedir.aspx?ID=NJN2WT7UW3MH-7-135</Url>
+      <Description>NJN2WT7UW3MH-7-135</Description>
+    </_dlc_DocIdUrl>
+    <AverageRating xmlns="http://schemas.microsoft.com/sharepoint/v3" xsi:nil="true"/>
+  </documentManagement>
+</p:properties>
+</file>
+
+<file path=customXml/item2.xml><?xml version="1.0" encoding="utf-8"?>
+<?mso-contentType ?>
+<FormTemplates xmlns="http://schemas.microsoft.com/sharepoint/v3/contenttype/forms">
+  <Display>DocumentLibraryForm</Display>
+  <Edit>DocumentLibraryForm</Edit>
+  <New>DocumentLibraryForm</New>
+</FormTemplates>
+</file>
+
+<file path=customXml/item3.xml><?xml version="1.0" encoding="utf-8"?>
 <ct:contentTypeSchema xmlns:ct="http://schemas.microsoft.com/office/2006/metadata/contentType" xmlns:ma="http://schemas.microsoft.com/office/2006/metadata/properties/metaAttributes" ct:_="" ma:_="" ma:contentTypeName="Document" ma:contentTypeID="0x010100399A9BCA57566D4188E9CA16F86D6408" ma:contentTypeVersion="2" ma:contentTypeDescription="Create a new document." ma:contentTypeScope="" ma:versionID="290b8c847d18631d1d483ff51e5fcd5a">
   <xsd:schema xmlns:xsd="http://www.w3.org/2001/XMLSchema" xmlns:xs="http://www.w3.org/2001/XMLSchema" xmlns:p="http://schemas.microsoft.com/office/2006/metadata/properties" xmlns:ns1="http://schemas.microsoft.com/sharepoint/v3" xmlns:ns2="3f10cd6e-67ef-4e06-a184-a118dcfc3794" targetNamespace="http://schemas.microsoft.com/office/2006/metadata/properties" ma:root="true" ma:fieldsID="22722b2315d693ca6744ca36c727b733" ns1:_="" ns2:_="">
     <xsd:import namespace="http://schemas.microsoft.com/sharepoint/v3"/>
@@ -11857,28 +11881,6 @@
 </ct:contentTypeSchema>
 </file>
 
-<file path=customXml/item2.xml><?xml version="1.0" encoding="utf-8"?>
-<?mso-contentType ?>
-<FormTemplates xmlns="http://schemas.microsoft.com/sharepoint/v3/contenttype/forms">
-  <Display>DocumentLibraryForm</Display>
-  <Edit>DocumentLibraryForm</Edit>
-  <New>DocumentLibraryForm</New>
-</FormTemplates>
-</file>
-
-<file path=customXml/item3.xml><?xml version="1.0" encoding="utf-8"?>
-<p:properties xmlns:p="http://schemas.microsoft.com/office/2006/metadata/properties" xmlns:xsi="http://www.w3.org/2001/XMLSchema-instance" xmlns:pc="http://schemas.microsoft.com/office/infopath/2007/PartnerControls">
-  <documentManagement>
-    <_dlc_DocId xmlns="3f10cd6e-67ef-4e06-a184-a118dcfc3794">NJN2WT7UW3MH-7-135</_dlc_DocId>
-    <_dlc_DocIdUrl xmlns="3f10cd6e-67ef-4e06-a184-a118dcfc3794">
-      <Url>http://gmt-teams/support/softdev/_layouts/DocIdRedir.aspx?ID=NJN2WT7UW3MH-7-135</Url>
-      <Description>NJN2WT7UW3MH-7-135</Description>
-    </_dlc_DocIdUrl>
-    <AverageRating xmlns="http://schemas.microsoft.com/sharepoint/v3" xsi:nil="true"/>
-  </documentManagement>
-</p:properties>
-</file>
-
 <file path=customXml/item4.xml><?xml version="1.0" encoding="utf-8"?>
 <?mso-contentType ?>
 <spe:Receivers xmlns:spe="http://schemas.microsoft.com/sharepoint/events">
@@ -11926,6 +11928,25 @@
 </file>
 
 <file path=customXml/itemProps1.xml><?xml version="1.0" encoding="utf-8"?>
+<ds:datastoreItem xmlns:ds="http://schemas.openxmlformats.org/officeDocument/2006/customXml" ds:itemID="{2574B6B6-859E-4D47-B5B5-2F8A663167D3}">
+  <ds:schemaRefs>
+    <ds:schemaRef ds:uri="http://schemas.microsoft.com/office/2006/metadata/properties"/>
+    <ds:schemaRef ds:uri="http://schemas.microsoft.com/office/infopath/2007/PartnerControls"/>
+    <ds:schemaRef ds:uri="3f10cd6e-67ef-4e06-a184-a118dcfc3794"/>
+    <ds:schemaRef ds:uri="http://schemas.microsoft.com/sharepoint/v3"/>
+  </ds:schemaRefs>
+</ds:datastoreItem>
+</file>
+
+<file path=customXml/itemProps2.xml><?xml version="1.0" encoding="utf-8"?>
+<ds:datastoreItem xmlns:ds="http://schemas.openxmlformats.org/officeDocument/2006/customXml" ds:itemID="{D558CF23-FCB3-4D64-BEEA-3B9519B023D9}">
+  <ds:schemaRefs>
+    <ds:schemaRef ds:uri="http://schemas.microsoft.com/sharepoint/v3/contenttype/forms"/>
+  </ds:schemaRefs>
+</ds:datastoreItem>
+</file>
+
+<file path=customXml/itemProps3.xml><?xml version="1.0" encoding="utf-8"?>
 <ds:datastoreItem xmlns:ds="http://schemas.openxmlformats.org/officeDocument/2006/customXml" ds:itemID="{2E4AC93A-CA33-4EB8-84AE-434C71C0433B}">
   <ds:schemaRefs>
     <ds:schemaRef ds:uri="http://schemas.microsoft.com/office/2006/metadata/contentType"/>
@@ -11944,25 +11965,6 @@
 </ds:datastoreItem>
 </file>
 
-<file path=customXml/itemProps2.xml><?xml version="1.0" encoding="utf-8"?>
-<ds:datastoreItem xmlns:ds="http://schemas.openxmlformats.org/officeDocument/2006/customXml" ds:itemID="{D558CF23-FCB3-4D64-BEEA-3B9519B023D9}">
-  <ds:schemaRefs>
-    <ds:schemaRef ds:uri="http://schemas.microsoft.com/sharepoint/v3/contenttype/forms"/>
-  </ds:schemaRefs>
-</ds:datastoreItem>
-</file>
-
-<file path=customXml/itemProps3.xml><?xml version="1.0" encoding="utf-8"?>
-<ds:datastoreItem xmlns:ds="http://schemas.openxmlformats.org/officeDocument/2006/customXml" ds:itemID="{2574B6B6-859E-4D47-B5B5-2F8A663167D3}">
-  <ds:schemaRefs>
-    <ds:schemaRef ds:uri="http://schemas.microsoft.com/office/2006/metadata/properties"/>
-    <ds:schemaRef ds:uri="http://schemas.microsoft.com/office/infopath/2007/PartnerControls"/>
-    <ds:schemaRef ds:uri="3f10cd6e-67ef-4e06-a184-a118dcfc3794"/>
-    <ds:schemaRef ds:uri="http://schemas.microsoft.com/sharepoint/v3"/>
-  </ds:schemaRefs>
-</ds:datastoreItem>
-</file>
-
 <file path=customXml/itemProps4.xml><?xml version="1.0" encoding="utf-8"?>
 <ds:datastoreItem xmlns:ds="http://schemas.openxmlformats.org/officeDocument/2006/customXml" ds:itemID="{5BC4B29C-4555-46F6-A281-17873862A286}">
   <ds:schemaRefs>

</xml_diff>

<commit_message>
Power Point Slides Update - Additional Work on DbContextScopeFactory
</commit_message>
<xml_diff>
--- a/20160128 Tech Punch - Entity Framework.pptx
+++ b/20160128 Tech Punch - Entity Framework.pptx
@@ -5,7 +5,7 @@
     <p:sldMasterId id="2147483815" r:id="rId5"/>
   </p:sldMasterIdLst>
   <p:notesMasterIdLst>
-    <p:notesMasterId r:id="rId12"/>
+    <p:notesMasterId r:id="rId14"/>
   </p:notesMasterIdLst>
   <p:sldIdLst>
     <p:sldId id="326" r:id="rId6"/>
@@ -14,6 +14,8 @@
     <p:sldId id="330" r:id="rId9"/>
     <p:sldId id="329" r:id="rId10"/>
     <p:sldId id="345" r:id="rId11"/>
+    <p:sldId id="346" r:id="rId12"/>
+    <p:sldId id="347" r:id="rId13"/>
   </p:sldIdLst>
   <p:sldSz cx="9906000" cy="6858000" type="A4"/>
   <p:notesSz cx="6797675" cy="9874250"/>
@@ -23,7 +25,7 @@
     </p:custShow>
   </p:custShowLst>
   <p:custDataLst>
-    <p:tags r:id="rId13"/>
+    <p:tags r:id="rId15"/>
   </p:custDataLst>
   <p:defaultTextStyle>
     <a:defPPr>
@@ -152,7 +154,7 @@
   </p:defaultTextStyle>
   <p:extLst>
     <p:ext uri="{EFAFB233-063F-42B5-8137-9DF3F51BA10A}">
-      <p15:sldGuideLst xmlns:p15="http://schemas.microsoft.com/office/powerpoint/2012/main" xmlns="">
+      <p15:sldGuideLst xmlns="" xmlns:p15="http://schemas.microsoft.com/office/powerpoint/2012/main">
         <p15:guide id="1" orient="horz" pos="335">
           <p15:clr>
             <a:srgbClr val="A4A3A4"/>
@@ -370,7 +372,7 @@
               <a:pPr>
                 <a:defRPr/>
               </a:pPr>
-              <a:t>23/01/2016</a:t>
+              <a:t>24/01/2016</a:t>
             </a:fld>
             <a:endParaRPr lang="en-GB" dirty="0"/>
           </a:p>
@@ -8914,7 +8916,7 @@
           <a:graphicData uri="http://schemas.openxmlformats.org/presentationml/2006/ole">
             <mc:AlternateContent xmlns:mc="http://schemas.openxmlformats.org/markup-compatibility/2006">
               <mc:Choice xmlns:v="urn:schemas-microsoft-com:vml" Requires="v">
-                <p:oleObj spid="_x0000_s2107" name="think-cell Slide" r:id="rId28" imgW="360" imgH="360" progId="">
+                <p:oleObj spid="_x0000_s2113" name="think-cell Slide" r:id="rId28" imgW="360" imgH="360" progId="">
                   <p:embed/>
                 </p:oleObj>
               </mc:Choice>
@@ -10003,8 +10005,8 @@
         </p:nvSpPr>
         <p:spPr>
           <a:xfrm>
-            <a:off x="412883" y="708896"/>
-            <a:ext cx="9073222" cy="5110013"/>
+            <a:off x="412883" y="584205"/>
+            <a:ext cx="9073222" cy="5369786"/>
           </a:xfrm>
         </p:spPr>
         <p:txBody>
@@ -10015,126 +10017,101 @@
           </a:p>
           <a:p>
             <a:r>
+              <a:rPr lang="en-GB" sz="1800" dirty="0" smtClean="0"/>
+              <a:t>High Level Overview of Entity Framework 6</a:t>
+            </a:r>
+          </a:p>
+          <a:p>
+            <a:pPr lvl="1"/>
+            <a:r>
               <a:rPr lang="en-GB" sz="1800" dirty="0"/>
-              <a:t>My experience with Entity </a:t>
-            </a:r>
+              <a:t>Core Services</a:t>
+            </a:r>
+          </a:p>
+          <a:p>
+            <a:pPr lvl="2"/>
+            <a:r>
+              <a:rPr lang="en-GB" sz="1800" dirty="0" err="1"/>
+              <a:t>Linq</a:t>
+            </a:r>
+            <a:r>
+              <a:rPr lang="en-GB" sz="1800" dirty="0"/>
+              <a:t> Provider</a:t>
+            </a:r>
+          </a:p>
+          <a:p>
+            <a:pPr lvl="2"/>
+            <a:r>
+              <a:rPr lang="en-GB" sz="1800" dirty="0"/>
+              <a:t>Change Tracker</a:t>
+            </a:r>
+          </a:p>
+          <a:p>
+            <a:pPr lvl="2"/>
+            <a:r>
+              <a:rPr lang="en-GB" sz="1800" dirty="0" err="1"/>
+              <a:t>DbMigrations</a:t>
+            </a:r>
+            <a:endParaRPr lang="en-GB" sz="1800" dirty="0"/>
+          </a:p>
+          <a:p>
+            <a:pPr lvl="1"/>
             <a:r>
               <a:rPr lang="en-GB" sz="1800" dirty="0" smtClean="0"/>
-              <a:t>Framework</a:t>
+              <a:t>New Features</a:t>
             </a:r>
           </a:p>
           <a:p>
             <a:r>
               <a:rPr lang="en-GB" sz="1800" dirty="0" smtClean="0"/>
-              <a:t>How </a:t>
-            </a:r>
+              <a:t>Considering other Micro ORMs</a:t>
+            </a:r>
+          </a:p>
+          <a:p>
+            <a:pPr lvl="1"/>
             <a:r>
               <a:rPr lang="en-GB" sz="1800" dirty="0" smtClean="0"/>
-              <a:t>to structure a project that makes use of Entity Framework</a:t>
-            </a:r>
-          </a:p>
-          <a:p>
-            <a:pPr lvl="2"/>
+              <a:t>Dapper (static)</a:t>
+            </a:r>
+          </a:p>
+          <a:p>
+            <a:pPr lvl="1"/>
             <a:r>
               <a:rPr lang="en-GB" sz="1800" dirty="0" smtClean="0"/>
-              <a:t>Unit of Work Pattern</a:t>
-            </a:r>
-          </a:p>
-          <a:p>
-            <a:pPr lvl="3"/>
-            <a:r>
-              <a:rPr lang="en-GB" sz="1600" dirty="0" smtClean="0"/>
-              <a:t>Repository Pattern</a:t>
-            </a:r>
-          </a:p>
-          <a:p>
-            <a:pPr lvl="2"/>
+              <a:t>Massive (dynamic)</a:t>
+            </a:r>
+          </a:p>
+          <a:p>
             <a:r>
               <a:rPr lang="en-GB" sz="1800" dirty="0" smtClean="0"/>
-              <a:t>Entity Framework Testing</a:t>
-            </a:r>
-          </a:p>
-          <a:p>
-            <a:pPr lvl="3"/>
+              <a:t>Demo</a:t>
+            </a:r>
+          </a:p>
+          <a:p>
+            <a:pPr lvl="1"/>
             <a:r>
               <a:rPr lang="en-GB" sz="1800" dirty="0" smtClean="0"/>
-              <a:t>How to Mock the </a:t>
-            </a:r>
-            <a:r>
-              <a:rPr lang="en-GB" sz="1800" dirty="0" err="1" smtClean="0"/>
-              <a:t>DbSet</a:t>
-            </a:r>
+              <a:t>How to structure a an Application that uses Repository Pattern</a:t>
+            </a:r>
+          </a:p>
+          <a:p>
+            <a:pPr lvl="1"/>
             <a:r>
               <a:rPr lang="en-GB" sz="1800" dirty="0" smtClean="0"/>
-              <a:t> – See </a:t>
-            </a:r>
+              <a:t>Bench mark tests</a:t>
+            </a:r>
+          </a:p>
+          <a:p>
             <a:r>
               <a:rPr lang="en-GB" sz="1800" dirty="0" smtClean="0"/>
-              <a:t>Pre-Release </a:t>
-            </a:r>
-            <a:r>
-              <a:rPr lang="en-GB" sz="1800" dirty="0" err="1" smtClean="0"/>
-              <a:t>Nuget</a:t>
-            </a:r>
+              <a:t>Entity Framework 7</a:t>
+            </a:r>
+          </a:p>
+          <a:p>
             <a:r>
               <a:rPr lang="en-GB" sz="1800" dirty="0" smtClean="0"/>
-              <a:t> </a:t>
-            </a:r>
-            <a:r>
-              <a:rPr lang="en-GB" sz="1800" dirty="0" smtClean="0"/>
-              <a:t>Packages</a:t>
-            </a:r>
-          </a:p>
-          <a:p>
-            <a:pPr lvl="4"/>
-            <a:r>
-              <a:rPr lang="en-GB" sz="1800" dirty="0" err="1" smtClean="0"/>
-              <a:t>EntityFramework.Testing.Moq</a:t>
-            </a:r>
-            <a:endParaRPr lang="en-GB" sz="1800" dirty="0"/>
-          </a:p>
-          <a:p>
-            <a:pPr lvl="4"/>
-            <a:r>
-              <a:rPr lang="en-GB" sz="1800" dirty="0" err="1" smtClean="0"/>
-              <a:t>EntityFramework.Testing</a:t>
-            </a:r>
-            <a:endParaRPr lang="en-GB" sz="1800" dirty="0" smtClean="0"/>
-          </a:p>
-          <a:p>
-            <a:r>
-              <a:rPr lang="en-GB" sz="1800" dirty="0"/>
-              <a:t>Entity Framework 6 Performance Tips</a:t>
-            </a:r>
-          </a:p>
-          <a:p>
-            <a:r>
-              <a:rPr lang="en-GB" sz="1800" dirty="0" smtClean="0"/>
-              <a:t>What’s </a:t>
-            </a:r>
-            <a:r>
-              <a:rPr lang="en-GB" sz="1800" dirty="0" smtClean="0"/>
-              <a:t>in Entity Framework 7</a:t>
-            </a:r>
-          </a:p>
-          <a:p>
-            <a:r>
-              <a:rPr lang="en-GB" sz="1800" dirty="0" smtClean="0"/>
-              <a:t>Other Micro ORMS to consider</a:t>
-            </a:r>
-          </a:p>
-          <a:p>
-            <a:pPr lvl="1"/>
-            <a:r>
-              <a:rPr lang="en-GB" sz="1800" dirty="0" smtClean="0"/>
-              <a:t>Performance tests against Entity Framework 6</a:t>
-            </a:r>
-          </a:p>
-          <a:p>
-            <a:endParaRPr lang="en-GB" dirty="0" smtClean="0"/>
-          </a:p>
-          <a:p>
-            <a:endParaRPr lang="en-GB" dirty="0" smtClean="0"/>
+              <a:t>Resources</a:t>
+            </a:r>
           </a:p>
         </p:txBody>
       </p:sp>
@@ -10202,14 +10179,19 @@
             <p:ph type="title"/>
           </p:nvPr>
         </p:nvSpPr>
-        <p:spPr/>
+        <p:spPr>
+          <a:xfrm>
+            <a:off x="412883" y="269702"/>
+            <a:ext cx="7920000" cy="499225"/>
+          </a:xfrm>
+        </p:spPr>
         <p:txBody>
           <a:bodyPr/>
           <a:lstStyle/>
           <a:p>
             <a:r>
               <a:rPr lang="en-GB" dirty="0" smtClean="0"/>
-              <a:t>My experience with Entity Framework</a:t>
+              <a:t>High Level Overview of Entity Framework 6</a:t>
             </a:r>
             <a:endParaRPr lang="en-GB" dirty="0"/>
           </a:p>
@@ -10236,373 +10218,382 @@
       </p:sp>
       <p:sp>
         <p:nvSpPr>
-          <p:cNvPr id="3" name="Rectangle 2"/>
-          <p:cNvSpPr/>
+          <p:cNvPr id="12" name="Text Placeholder 2"/>
+          <p:cNvSpPr>
+            <a:spLocks noGrp="1"/>
+          </p:cNvSpPr>
+          <p:nvPr>
+            <p:ph type="body" sz="quarter" idx="11"/>
+          </p:nvPr>
+        </p:nvSpPr>
+        <p:spPr>
+          <a:xfrm>
+            <a:off x="412883" y="2462646"/>
+            <a:ext cx="9073222" cy="3730336"/>
+          </a:xfrm>
+        </p:spPr>
+        <p:txBody>
+          <a:bodyPr/>
+          <a:lstStyle/>
+          <a:p>
+            <a:r>
+              <a:rPr lang="en-GB" sz="1100" dirty="0" smtClean="0"/>
+              <a:t>Asynchronous query and save</a:t>
+            </a:r>
+          </a:p>
+          <a:p>
+            <a:r>
+              <a:rPr lang="en-GB" sz="1100" dirty="0" smtClean="0"/>
+              <a:t>Connection resiliency</a:t>
+            </a:r>
+          </a:p>
+          <a:p>
+            <a:r>
+              <a:rPr lang="en-GB" sz="1100" dirty="0" smtClean="0"/>
+              <a:t>Code based configuration</a:t>
+            </a:r>
+          </a:p>
+          <a:p>
+            <a:r>
+              <a:rPr lang="en-GB" sz="1100" dirty="0" smtClean="0"/>
+              <a:t>Database command interception and logging</a:t>
+            </a:r>
+          </a:p>
+          <a:p>
+            <a:r>
+              <a:rPr lang="en-GB" sz="1100" dirty="0" smtClean="0"/>
+              <a:t>Code first CRUD stored procedures</a:t>
+            </a:r>
+          </a:p>
+          <a:p>
+            <a:r>
+              <a:rPr lang="en-GB" sz="1100" dirty="0" smtClean="0"/>
+              <a:t>Multiple contexts per database</a:t>
+            </a:r>
+          </a:p>
+          <a:p>
+            <a:r>
+              <a:rPr lang="en-GB" sz="1100" dirty="0" smtClean="0"/>
+              <a:t>Default transaction level for generated code first DB is now READ_COMMITTED_SNAPSHOT</a:t>
+            </a:r>
+          </a:p>
+          <a:p>
+            <a:r>
+              <a:rPr lang="en-GB" sz="1100" dirty="0" err="1" smtClean="0"/>
+              <a:t>Enums</a:t>
+            </a:r>
+            <a:r>
+              <a:rPr lang="en-GB" sz="1100" dirty="0" smtClean="0"/>
+              <a:t> and spatial support</a:t>
+            </a:r>
+          </a:p>
+          <a:p>
+            <a:r>
+              <a:rPr lang="en-GB" sz="1100" dirty="0" smtClean="0"/>
+              <a:t>Nested Entity Types</a:t>
+            </a:r>
+          </a:p>
+          <a:p>
+            <a:r>
+              <a:rPr lang="en-GB" sz="1100" dirty="0" smtClean="0"/>
+              <a:t>Support for a default Schema – </a:t>
+            </a:r>
+            <a:r>
+              <a:rPr lang="en-GB" sz="1100" dirty="0" err="1" smtClean="0"/>
+              <a:t>DBModelBuilder.HasDefaultSchema</a:t>
+            </a:r>
+            <a:endParaRPr lang="en-GB" sz="1100" dirty="0" smtClean="0"/>
+          </a:p>
+          <a:p>
+            <a:r>
+              <a:rPr lang="en-GB" sz="1100" dirty="0" smtClean="0"/>
+              <a:t>Configurable migrations history table</a:t>
+            </a:r>
+          </a:p>
+          <a:p>
+            <a:r>
+              <a:rPr lang="en-GB" sz="1100" dirty="0" smtClean="0"/>
+              <a:t>Creating context with an open connection</a:t>
+            </a:r>
+          </a:p>
+          <a:p>
+            <a:r>
+              <a:rPr lang="en-GB" sz="1100" dirty="0" smtClean="0"/>
+              <a:t>Improved transaction support</a:t>
+            </a:r>
+          </a:p>
+          <a:p>
+            <a:endParaRPr lang="en-GB" sz="1000" dirty="0" smtClean="0"/>
+          </a:p>
+          <a:p>
+            <a:endParaRPr lang="en-GB" sz="1000" dirty="0"/>
+          </a:p>
+        </p:txBody>
+      </p:sp>
+      <p:sp>
+        <p:nvSpPr>
+          <p:cNvPr id="13" name="Text Placeholder 2"/>
+          <p:cNvSpPr txBox="1">
+            <a:spLocks/>
+          </p:cNvSpPr>
           <p:nvPr/>
         </p:nvSpPr>
-        <p:spPr>
-          <a:xfrm>
-            <a:off x="697630" y="1394114"/>
-            <a:ext cx="2366247" cy="488373"/>
+        <p:spPr bwMode="auto">
+          <a:xfrm>
+            <a:off x="412883" y="1014844"/>
+            <a:ext cx="9073222" cy="1572492"/>
           </a:xfrm>
           <a:prstGeom prst="rect">
             <a:avLst/>
           </a:prstGeom>
-          <a:ln>
+          <a:noFill/>
+          <a:ln w="9525">
             <a:noFill/>
+            <a:miter lim="800000"/>
+            <a:headEnd/>
+            <a:tailEnd/>
           </a:ln>
-          <a:effectLst/>
-        </p:spPr>
-        <p:style>
-          <a:lnRef idx="1">
-            <a:schemeClr val="accent1"/>
-          </a:lnRef>
-          <a:fillRef idx="3">
-            <a:schemeClr val="accent1"/>
-          </a:fillRef>
-          <a:effectRef idx="2">
-            <a:schemeClr val="accent1"/>
-          </a:effectRef>
-          <a:fontRef idx="minor">
-            <a:schemeClr val="lt1"/>
-          </a:fontRef>
-        </p:style>
-        <p:txBody>
-          <a:bodyPr rtlCol="0" anchor="ctr"/>
-          <a:lstStyle/>
-          <a:p>
-            <a:pPr algn="ctr"/>
-            <a:r>
-              <a:rPr lang="en-GB" dirty="0" err="1" smtClean="0"/>
+        </p:spPr>
+        <p:txBody>
+          <a:bodyPr vert="horz" wrap="square" lIns="0" tIns="0" rIns="0" bIns="0" numCol="1" anchor="t" anchorCtr="0" compatLnSpc="1">
+            <a:prstTxWarp prst="textNoShape">
+              <a:avLst/>
+            </a:prstTxWarp>
+          </a:bodyPr>
+          <a:lstStyle>
+            <a:lvl1pPr marL="342000" indent="-252000" algn="l" rtl="0" eaLnBrk="1" fontAlgn="base" hangingPunct="1">
+              <a:spcBef>
+                <a:spcPts val="600"/>
+              </a:spcBef>
+              <a:spcAft>
+                <a:spcPts val="400"/>
+              </a:spcAft>
+              <a:buSzPct val="100000"/>
+              <a:buFont typeface="Symbol" pitchFamily="18" charset="2"/>
+              <a:buChar char="·"/>
+              <a:defRPr sz="1600" b="0">
+                <a:solidFill>
+                  <a:schemeClr val="tx2"/>
+                </a:solidFill>
+                <a:latin typeface="Calibri" pitchFamily="34" charset="0"/>
+                <a:ea typeface="+mn-ea"/>
+                <a:cs typeface="Calibri" pitchFamily="34" charset="0"/>
+              </a:defRPr>
+            </a:lvl1pPr>
+            <a:lvl2pPr marL="720000" indent="-252000" algn="l" rtl="0" eaLnBrk="1" fontAlgn="base" hangingPunct="1">
+              <a:lnSpc>
+                <a:spcPct val="100000"/>
+              </a:lnSpc>
+              <a:spcBef>
+                <a:spcPts val="400"/>
+              </a:spcBef>
+              <a:spcAft>
+                <a:spcPct val="0"/>
+              </a:spcAft>
+              <a:buFont typeface="Calibri" pitchFamily="34" charset="0"/>
+              <a:buChar char="–"/>
+              <a:defRPr sz="1400" b="0">
+                <a:solidFill>
+                  <a:schemeClr val="tx2"/>
+                </a:solidFill>
+                <a:latin typeface="Calibri" pitchFamily="34" charset="0"/>
+                <a:ea typeface="+mn-ea"/>
+                <a:cs typeface="Calibri" pitchFamily="34" charset="0"/>
+              </a:defRPr>
+            </a:lvl2pPr>
+            <a:lvl3pPr marL="1008000" indent="-252000" algn="l" rtl="0" eaLnBrk="1" fontAlgn="base" hangingPunct="1">
+              <a:spcBef>
+                <a:spcPts val="600"/>
+              </a:spcBef>
+              <a:spcAft>
+                <a:spcPct val="0"/>
+              </a:spcAft>
+              <a:buFont typeface="Wingdings" pitchFamily="2" charset="2"/>
+              <a:buChar char="§"/>
+              <a:defRPr sz="1400" b="0">
+                <a:solidFill>
+                  <a:schemeClr val="tx2"/>
+                </a:solidFill>
+                <a:latin typeface="Calibri" pitchFamily="34" charset="0"/>
+                <a:ea typeface="+mn-ea"/>
+                <a:cs typeface="Calibri" pitchFamily="34" charset="0"/>
+              </a:defRPr>
+            </a:lvl3pPr>
+            <a:lvl4pPr marL="1260000" indent="-180000" algn="l" rtl="0" eaLnBrk="1" fontAlgn="base" hangingPunct="1">
+              <a:lnSpc>
+                <a:spcPct val="100000"/>
+              </a:lnSpc>
+              <a:spcBef>
+                <a:spcPts val="400"/>
+              </a:spcBef>
+              <a:spcAft>
+                <a:spcPts val="0"/>
+              </a:spcAft>
+              <a:buFont typeface="Courier New" pitchFamily="49" charset="0"/>
+              <a:buChar char="o"/>
+              <a:defRPr sz="1200" b="0">
+                <a:solidFill>
+                  <a:schemeClr val="tx2"/>
+                </a:solidFill>
+                <a:latin typeface="Calibri" pitchFamily="34" charset="0"/>
+                <a:ea typeface="+mn-ea"/>
+                <a:cs typeface="Calibri" pitchFamily="34" charset="0"/>
+              </a:defRPr>
+            </a:lvl4pPr>
+            <a:lvl5pPr marL="1548000" indent="-180000" algn="l" rtl="0" eaLnBrk="1" fontAlgn="base" hangingPunct="1">
+              <a:lnSpc>
+                <a:spcPct val="100000"/>
+              </a:lnSpc>
+              <a:spcBef>
+                <a:spcPts val="400"/>
+              </a:spcBef>
+              <a:spcAft>
+                <a:spcPts val="0"/>
+              </a:spcAft>
+              <a:buFont typeface="Calibri" pitchFamily="34" charset="0"/>
+              <a:buChar char="*"/>
+              <a:defRPr sz="1200" b="0">
+                <a:solidFill>
+                  <a:schemeClr val="tx2"/>
+                </a:solidFill>
+                <a:latin typeface="Calibri" pitchFamily="34" charset="0"/>
+                <a:ea typeface="+mn-ea"/>
+                <a:cs typeface="Calibri" pitchFamily="34" charset="0"/>
+              </a:defRPr>
+            </a:lvl5pPr>
+            <a:lvl6pPr marL="1000125" indent="-188913" algn="l" rtl="0" eaLnBrk="1" fontAlgn="base" hangingPunct="1">
+              <a:lnSpc>
+                <a:spcPts val="1900"/>
+              </a:lnSpc>
+              <a:spcBef>
+                <a:spcPct val="0"/>
+              </a:spcBef>
+              <a:spcAft>
+                <a:spcPts val="300"/>
+              </a:spcAft>
+              <a:buChar char="–"/>
+              <a:defRPr>
+                <a:solidFill>
+                  <a:schemeClr val="tx1"/>
+                </a:solidFill>
+                <a:latin typeface="ITC Avant Garde Std Bk" charset="0"/>
+                <a:ea typeface="+mn-ea"/>
+              </a:defRPr>
+            </a:lvl6pPr>
+            <a:lvl7pPr marL="1457325" indent="-188913" algn="l" rtl="0" eaLnBrk="1" fontAlgn="base" hangingPunct="1">
+              <a:lnSpc>
+                <a:spcPts val="1900"/>
+              </a:lnSpc>
+              <a:spcBef>
+                <a:spcPct val="0"/>
+              </a:spcBef>
+              <a:spcAft>
+                <a:spcPts val="300"/>
+              </a:spcAft>
+              <a:buChar char="–"/>
+              <a:defRPr>
+                <a:solidFill>
+                  <a:schemeClr val="tx1"/>
+                </a:solidFill>
+                <a:latin typeface="ITC Avant Garde Std Bk" charset="0"/>
+                <a:ea typeface="+mn-ea"/>
+              </a:defRPr>
+            </a:lvl7pPr>
+            <a:lvl8pPr marL="1914525" indent="-188913" algn="l" rtl="0" eaLnBrk="1" fontAlgn="base" hangingPunct="1">
+              <a:lnSpc>
+                <a:spcPts val="1900"/>
+              </a:lnSpc>
+              <a:spcBef>
+                <a:spcPct val="0"/>
+              </a:spcBef>
+              <a:spcAft>
+                <a:spcPts val="300"/>
+              </a:spcAft>
+              <a:buChar char="–"/>
+              <a:defRPr>
+                <a:solidFill>
+                  <a:schemeClr val="tx1"/>
+                </a:solidFill>
+                <a:latin typeface="ITC Avant Garde Std Bk" charset="0"/>
+                <a:ea typeface="+mn-ea"/>
+              </a:defRPr>
+            </a:lvl8pPr>
+            <a:lvl9pPr marL="2371725" indent="-188913" algn="l" rtl="0" eaLnBrk="1" fontAlgn="base" hangingPunct="1">
+              <a:lnSpc>
+                <a:spcPts val="1900"/>
+              </a:lnSpc>
+              <a:spcBef>
+                <a:spcPct val="0"/>
+              </a:spcBef>
+              <a:spcAft>
+                <a:spcPts val="300"/>
+              </a:spcAft>
+              <a:buChar char="–"/>
+              <a:defRPr>
+                <a:solidFill>
+                  <a:schemeClr val="tx1"/>
+                </a:solidFill>
+                <a:latin typeface="ITC Avant Garde Std Bk" charset="0"/>
+                <a:ea typeface="+mn-ea"/>
+              </a:defRPr>
+            </a:lvl9pPr>
+          </a:lstStyle>
+          <a:p>
+            <a:r>
+              <a:rPr lang="en-GB" sz="1100" b="1" kern="0" dirty="0" err="1" smtClean="0"/>
               <a:t>Linq</a:t>
             </a:r>
             <a:r>
-              <a:rPr lang="en-GB" dirty="0" smtClean="0"/>
+              <a:rPr lang="en-GB" sz="1100" b="1" kern="0" dirty="0" smtClean="0"/>
               <a:t> Provider</a:t>
             </a:r>
-            <a:endParaRPr lang="en-GB" dirty="0"/>
-          </a:p>
-        </p:txBody>
-      </p:sp>
-      <p:sp>
-        <p:nvSpPr>
-          <p:cNvPr id="5" name="Rectangle 4"/>
-          <p:cNvSpPr/>
-          <p:nvPr/>
-        </p:nvSpPr>
-        <p:spPr>
-          <a:xfrm>
-            <a:off x="685799" y="2242705"/>
-            <a:ext cx="2389909" cy="488373"/>
-          </a:xfrm>
-          <a:prstGeom prst="rect">
-            <a:avLst/>
-          </a:prstGeom>
-          <a:ln>
-            <a:noFill/>
-          </a:ln>
-          <a:effectLst/>
-        </p:spPr>
-        <p:style>
-          <a:lnRef idx="1">
-            <a:schemeClr val="accent1"/>
-          </a:lnRef>
-          <a:fillRef idx="3">
-            <a:schemeClr val="accent1"/>
-          </a:fillRef>
-          <a:effectRef idx="2">
-            <a:schemeClr val="accent1"/>
-          </a:effectRef>
-          <a:fontRef idx="minor">
-            <a:schemeClr val="lt1"/>
-          </a:fontRef>
-        </p:style>
-        <p:txBody>
-          <a:bodyPr rtlCol="0" anchor="ctr"/>
-          <a:lstStyle/>
-          <a:p>
-            <a:pPr algn="ctr"/>
-            <a:r>
-              <a:rPr lang="en-GB" dirty="0" smtClean="0"/>
-              <a:t>Change Tracker</a:t>
-            </a:r>
-            <a:endParaRPr lang="en-GB" dirty="0"/>
-          </a:p>
-        </p:txBody>
-      </p:sp>
-      <p:sp>
-        <p:nvSpPr>
-          <p:cNvPr id="6" name="Rectangle 5"/>
-          <p:cNvSpPr/>
-          <p:nvPr/>
-        </p:nvSpPr>
-        <p:spPr>
-          <a:xfrm>
-            <a:off x="697630" y="4355524"/>
-            <a:ext cx="2389909" cy="488373"/>
-          </a:xfrm>
-          <a:prstGeom prst="rect">
-            <a:avLst/>
-          </a:prstGeom>
-          <a:ln>
-            <a:noFill/>
-          </a:ln>
-          <a:effectLst/>
-        </p:spPr>
-        <p:style>
-          <a:lnRef idx="1">
-            <a:schemeClr val="accent1"/>
-          </a:lnRef>
-          <a:fillRef idx="3">
-            <a:schemeClr val="accent1"/>
-          </a:fillRef>
-          <a:effectRef idx="2">
-            <a:schemeClr val="accent1"/>
-          </a:effectRef>
-          <a:fontRef idx="minor">
-            <a:schemeClr val="lt1"/>
-          </a:fontRef>
-        </p:style>
-        <p:txBody>
-          <a:bodyPr rtlCol="0" anchor="ctr"/>
-          <a:lstStyle/>
-          <a:p>
-            <a:pPr algn="ctr"/>
-            <a:r>
-              <a:rPr lang="en-GB" dirty="0" smtClean="0"/>
-              <a:t>Unit of Work</a:t>
-            </a:r>
-            <a:endParaRPr lang="en-GB" dirty="0"/>
-          </a:p>
-        </p:txBody>
-      </p:sp>
-      <p:sp>
-        <p:nvSpPr>
-          <p:cNvPr id="7" name="Rectangle 6"/>
-          <p:cNvSpPr/>
-          <p:nvPr/>
-        </p:nvSpPr>
-        <p:spPr>
-          <a:xfrm>
-            <a:off x="697630" y="3165764"/>
-            <a:ext cx="2389909" cy="488373"/>
-          </a:xfrm>
-          <a:prstGeom prst="rect">
-            <a:avLst/>
-          </a:prstGeom>
-          <a:ln>
-            <a:noFill/>
-          </a:ln>
-          <a:effectLst/>
-        </p:spPr>
-        <p:style>
-          <a:lnRef idx="1">
-            <a:schemeClr val="accent1"/>
-          </a:lnRef>
-          <a:fillRef idx="3">
-            <a:schemeClr val="accent1"/>
-          </a:fillRef>
-          <a:effectRef idx="2">
-            <a:schemeClr val="accent1"/>
-          </a:effectRef>
-          <a:fontRef idx="minor">
-            <a:schemeClr val="lt1"/>
-          </a:fontRef>
-        </p:style>
-        <p:txBody>
-          <a:bodyPr rtlCol="0" anchor="ctr"/>
-          <a:lstStyle/>
-          <a:p>
-            <a:pPr algn="ctr"/>
-            <a:r>
-              <a:rPr lang="en-GB" dirty="0" smtClean="0"/>
-              <a:t>DB Migrations</a:t>
-            </a:r>
-            <a:endParaRPr lang="en-GB" dirty="0"/>
-          </a:p>
-        </p:txBody>
-      </p:sp>
-      <p:sp>
-        <p:nvSpPr>
-          <p:cNvPr id="8" name="Rectangle 7"/>
-          <p:cNvSpPr/>
-          <p:nvPr/>
-        </p:nvSpPr>
-        <p:spPr>
-          <a:xfrm>
-            <a:off x="697630" y="5204115"/>
-            <a:ext cx="2389909" cy="488373"/>
-          </a:xfrm>
-          <a:prstGeom prst="rect">
-            <a:avLst/>
-          </a:prstGeom>
-          <a:ln>
-            <a:noFill/>
-          </a:ln>
-          <a:effectLst/>
-        </p:spPr>
-        <p:style>
-          <a:lnRef idx="1">
-            <a:schemeClr val="accent1"/>
-          </a:lnRef>
-          <a:fillRef idx="3">
-            <a:schemeClr val="accent1"/>
-          </a:fillRef>
-          <a:effectRef idx="2">
-            <a:schemeClr val="accent1"/>
-          </a:effectRef>
-          <a:fontRef idx="minor">
-            <a:schemeClr val="lt1"/>
-          </a:fontRef>
-        </p:style>
-        <p:txBody>
-          <a:bodyPr rtlCol="0" anchor="ctr"/>
-          <a:lstStyle/>
-          <a:p>
-            <a:pPr algn="ctr"/>
-            <a:r>
-              <a:rPr lang="en-GB" dirty="0" smtClean="0"/>
-              <a:t>Code First</a:t>
-            </a:r>
-            <a:endParaRPr lang="en-GB" dirty="0"/>
-          </a:p>
-        </p:txBody>
-      </p:sp>
-      <p:sp>
-        <p:nvSpPr>
-          <p:cNvPr id="9" name="Rectangle 8"/>
-          <p:cNvSpPr/>
-          <p:nvPr/>
-        </p:nvSpPr>
-        <p:spPr>
-          <a:xfrm>
-            <a:off x="3896591" y="4355525"/>
-            <a:ext cx="2389909" cy="351558"/>
-          </a:xfrm>
-          <a:prstGeom prst="rect">
-            <a:avLst/>
-          </a:prstGeom>
-          <a:ln>
-            <a:noFill/>
-          </a:ln>
-          <a:effectLst/>
-        </p:spPr>
-        <p:style>
-          <a:lnRef idx="1">
-            <a:schemeClr val="accent1"/>
-          </a:lnRef>
-          <a:fillRef idx="3">
-            <a:schemeClr val="accent1"/>
-          </a:fillRef>
-          <a:effectRef idx="2">
-            <a:schemeClr val="accent1"/>
-          </a:effectRef>
-          <a:fontRef idx="minor">
-            <a:schemeClr val="lt1"/>
-          </a:fontRef>
-        </p:style>
-        <p:txBody>
-          <a:bodyPr rtlCol="0" anchor="ctr"/>
-          <a:lstStyle/>
-          <a:p>
-            <a:pPr algn="ctr"/>
-            <a:r>
-              <a:rPr lang="en-GB" dirty="0" smtClean="0"/>
-              <a:t>Command Interceptors</a:t>
-            </a:r>
-            <a:endParaRPr lang="en-GB" dirty="0"/>
-          </a:p>
-        </p:txBody>
-      </p:sp>
-      <p:sp>
-        <p:nvSpPr>
-          <p:cNvPr id="10" name="Rectangle 9"/>
-          <p:cNvSpPr/>
-          <p:nvPr/>
-        </p:nvSpPr>
-        <p:spPr>
-          <a:xfrm>
-            <a:off x="3896590" y="4859483"/>
-            <a:ext cx="2389909" cy="351558"/>
-          </a:xfrm>
-          <a:prstGeom prst="rect">
-            <a:avLst/>
-          </a:prstGeom>
-          <a:ln>
-            <a:noFill/>
-          </a:ln>
-          <a:effectLst/>
-        </p:spPr>
-        <p:style>
-          <a:lnRef idx="1">
-            <a:schemeClr val="accent1"/>
-          </a:lnRef>
-          <a:fillRef idx="3">
-            <a:schemeClr val="accent1"/>
-          </a:fillRef>
-          <a:effectRef idx="2">
-            <a:schemeClr val="accent1"/>
-          </a:effectRef>
-          <a:fontRef idx="minor">
-            <a:schemeClr val="lt1"/>
-          </a:fontRef>
-        </p:style>
-        <p:txBody>
-          <a:bodyPr rtlCol="0" anchor="ctr"/>
-          <a:lstStyle/>
-          <a:p>
-            <a:pPr algn="ctr"/>
-            <a:r>
-              <a:rPr lang="en-GB" dirty="0" smtClean="0"/>
-              <a:t>Validation Attributes</a:t>
-            </a:r>
-            <a:endParaRPr lang="en-GB" dirty="0"/>
-          </a:p>
-        </p:txBody>
-      </p:sp>
-      <p:sp>
-        <p:nvSpPr>
-          <p:cNvPr id="11" name="Rectangle 10"/>
-          <p:cNvSpPr/>
-          <p:nvPr/>
-        </p:nvSpPr>
-        <p:spPr>
-          <a:xfrm>
-            <a:off x="3896589" y="5363441"/>
-            <a:ext cx="2389909" cy="351558"/>
-          </a:xfrm>
-          <a:prstGeom prst="rect">
-            <a:avLst/>
-          </a:prstGeom>
-          <a:ln>
-            <a:noFill/>
-          </a:ln>
-          <a:effectLst/>
-        </p:spPr>
-        <p:style>
-          <a:lnRef idx="1">
-            <a:schemeClr val="accent1"/>
-          </a:lnRef>
-          <a:fillRef idx="3">
-            <a:schemeClr val="accent1"/>
-          </a:fillRef>
-          <a:effectRef idx="2">
-            <a:schemeClr val="accent1"/>
-          </a:effectRef>
-          <a:fontRef idx="minor">
-            <a:schemeClr val="lt1"/>
-          </a:fontRef>
-        </p:style>
-        <p:txBody>
-          <a:bodyPr rtlCol="0" anchor="ctr"/>
-          <a:lstStyle/>
-          <a:p>
-            <a:pPr algn="ctr"/>
-            <a:r>
-              <a:rPr lang="en-GB" dirty="0" smtClean="0"/>
-              <a:t>Validation Attributes</a:t>
-            </a:r>
-            <a:endParaRPr lang="en-GB" dirty="0"/>
+          </a:p>
+          <a:p>
+            <a:pPr lvl="1"/>
+            <a:r>
+              <a:rPr lang="en-GB" sz="1100" b="1" kern="0" dirty="0" smtClean="0"/>
+              <a:t>Originated from the </a:t>
+            </a:r>
+            <a:r>
+              <a:rPr lang="en-GB" sz="1100" b="1" kern="0" dirty="0" err="1" smtClean="0"/>
+              <a:t>LinqToSql</a:t>
+            </a:r>
+            <a:r>
+              <a:rPr lang="en-GB" sz="1100" b="1" kern="0" dirty="0" smtClean="0"/>
+              <a:t> </a:t>
+            </a:r>
+            <a:r>
+              <a:rPr lang="en-GB" sz="1100" b="1" kern="0" dirty="0" err="1" smtClean="0"/>
+              <a:t>Linq</a:t>
+            </a:r>
+            <a:r>
+              <a:rPr lang="en-GB" sz="1100" b="1" kern="0" dirty="0" smtClean="0"/>
+              <a:t> Provider</a:t>
+            </a:r>
+          </a:p>
+          <a:p>
+            <a:r>
+              <a:rPr lang="en-GB" sz="1100" b="1" kern="0" dirty="0" err="1" smtClean="0"/>
+              <a:t>DbChangeTracker</a:t>
+            </a:r>
+            <a:endParaRPr lang="en-GB" sz="1100" b="1" kern="0" dirty="0"/>
+          </a:p>
+          <a:p>
+            <a:pPr lvl="1"/>
+            <a:r>
+              <a:rPr lang="en-GB" sz="1100" b="1" kern="0" dirty="0"/>
+              <a:t>Unit of Work : Maintains a list of objects affected by a business transaction and coordinates the writing out of changes and the resolution of concurrency problems.</a:t>
+            </a:r>
+          </a:p>
+          <a:p>
+            <a:r>
+              <a:rPr lang="en-GB" sz="1100" b="1" kern="0" dirty="0" err="1" smtClean="0"/>
+              <a:t>DbMigrations</a:t>
+            </a:r>
+            <a:endParaRPr lang="en-GB" sz="1100" b="1" kern="0" dirty="0" smtClean="0"/>
+          </a:p>
+          <a:p>
+            <a:endParaRPr lang="en-GB" sz="1000" kern="0" dirty="0"/>
           </a:p>
         </p:txBody>
       </p:sp>
@@ -10663,7 +10654,7 @@
           <a:p>
             <a:r>
               <a:rPr lang="en-GB" dirty="0" smtClean="0"/>
-              <a:t>Header</a:t>
+              <a:t>Considering other Micro ORMs</a:t>
             </a:r>
             <a:endParaRPr lang="en-GB" dirty="0"/>
           </a:p>
@@ -10685,37 +10676,78 @@
           <a:lstStyle/>
           <a:p>
             <a:r>
-              <a:rPr lang="en-GB" dirty="0" err="1" smtClean="0"/>
-              <a:t>sadsd</a:t>
-            </a:r>
-            <a:endParaRPr lang="en-GB" dirty="0" smtClean="0"/>
-          </a:p>
-          <a:p>
-            <a:pPr marL="90000" indent="0">
-              <a:buNone/>
-            </a:pPr>
-            <a:endParaRPr lang="en-GB" dirty="0" smtClean="0"/>
-          </a:p>
-          <a:p>
-            <a:pPr>
-              <a:buFont typeface="Arial" panose="020B0604020202020204" pitchFamily="34" charset="0"/>
-              <a:buChar char="•"/>
-            </a:pPr>
-            <a:r>
-              <a:rPr lang="en-US" dirty="0" smtClean="0"/>
-              <a:t>1</a:t>
-            </a:r>
-          </a:p>
-          <a:p>
-            <a:pPr>
-              <a:buFont typeface="Arial" panose="020B0604020202020204" pitchFamily="34" charset="0"/>
-              <a:buChar char="•"/>
-            </a:pPr>
-            <a:r>
-              <a:rPr lang="en-US" i="1" dirty="0" smtClean="0"/>
-              <a:t>2</a:t>
+              <a:rPr lang="en-GB" dirty="0" smtClean="0"/>
+              <a:t>Dapper </a:t>
+            </a:r>
+            <a:r>
+              <a:rPr lang="en-GB" dirty="0"/>
+              <a:t>(static)</a:t>
+            </a:r>
+          </a:p>
+          <a:p>
+            <a:r>
+              <a:rPr lang="en-GB" dirty="0" smtClean="0"/>
+              <a:t>Massive </a:t>
+            </a:r>
+            <a:r>
+              <a:rPr lang="en-GB" dirty="0"/>
+              <a:t>(dynamic)</a:t>
+            </a:r>
+          </a:p>
+          <a:p>
+            <a:r>
+              <a:rPr lang="en-GB" dirty="0" smtClean="0"/>
+              <a:t>Advantageous</a:t>
+            </a:r>
+          </a:p>
+          <a:p>
+            <a:r>
+              <a:rPr lang="en-GB" dirty="0" smtClean="0"/>
+              <a:t>Speed </a:t>
+            </a:r>
+            <a:r>
+              <a:rPr lang="en-GB" dirty="0"/>
+              <a:t>(serialisation/execution), lightweight, simple to implement</a:t>
+            </a:r>
+          </a:p>
+          <a:p>
+            <a:r>
+              <a:rPr lang="en-GB" dirty="0" smtClean="0"/>
+              <a:t>Better </a:t>
+            </a:r>
+            <a:r>
+              <a:rPr lang="en-GB" dirty="0"/>
+              <a:t>control over SQL generated</a:t>
+            </a:r>
+          </a:p>
+          <a:p>
+            <a:r>
+              <a:rPr lang="en-GB" dirty="0" smtClean="0"/>
+              <a:t>Disadvantageous</a:t>
             </a:r>
             <a:endParaRPr lang="en-GB" dirty="0"/>
+          </a:p>
+          <a:p>
+            <a:r>
+              <a:rPr lang="en-GB" dirty="0" smtClean="0"/>
+              <a:t>No </a:t>
+            </a:r>
+            <a:r>
+              <a:rPr lang="en-GB" dirty="0" err="1"/>
+              <a:t>LinqProvider</a:t>
+            </a:r>
+            <a:r>
+              <a:rPr lang="en-GB" dirty="0"/>
+              <a:t>, </a:t>
+            </a:r>
+            <a:r>
+              <a:rPr lang="en-GB" dirty="0" err="1"/>
+              <a:t>DbMigrations</a:t>
+            </a:r>
+            <a:r>
+              <a:rPr lang="en-GB" dirty="0"/>
+              <a:t> features</a:t>
+            </a:r>
           </a:p>
         </p:txBody>
       </p:sp>
@@ -10977,7 +11009,7 @@
           <a:p>
             <a:r>
               <a:rPr lang="en-GB" dirty="0" smtClean="0"/>
-              <a:t>Questions</a:t>
+              <a:t>Demo</a:t>
             </a:r>
             <a:endParaRPr lang="en-GB" dirty="0"/>
           </a:p>
@@ -10998,6 +11030,42 @@
           <a:bodyPr/>
           <a:lstStyle/>
           <a:p>
+            <a:r>
+              <a:rPr lang="en-GB" dirty="0"/>
+              <a:t>- Demo</a:t>
+            </a:r>
+          </a:p>
+          <a:p>
+            <a:r>
+              <a:rPr lang="en-GB" dirty="0"/>
+              <a:t>	- What patterns do I use for a Web application vs. Thick Client/Windows Service</a:t>
+            </a:r>
+          </a:p>
+          <a:p>
+            <a:r>
+              <a:rPr lang="en-GB" dirty="0"/>
+              <a:t>		-- Repository vs Factory pattern</a:t>
+            </a:r>
+          </a:p>
+          <a:p>
+            <a:r>
+              <a:rPr lang="en-GB" dirty="0"/>
+              <a:t>	- Performance </a:t>
+            </a:r>
+            <a:r>
+              <a:rPr lang="en-GB" dirty="0" smtClean="0"/>
+              <a:t>Tests</a:t>
+            </a:r>
+          </a:p>
+          <a:p>
+            <a:r>
+              <a:rPr lang="en-GB" dirty="0" smtClean="0"/>
+              <a:t>Debug Unit Test in EF Open </a:t>
+            </a:r>
+            <a:r>
+              <a:rPr lang="en-GB" smtClean="0"/>
+              <a:t>Source Library</a:t>
+            </a:r>
             <a:endParaRPr lang="en-GB" dirty="0"/>
           </a:p>
         </p:txBody>
@@ -11025,6 +11093,376 @@
     <p:extLst>
       <p:ext uri="{BB962C8B-B14F-4D97-AF65-F5344CB8AC3E}">
         <p14:creationId xmlns:p14="http://schemas.microsoft.com/office/powerpoint/2010/main" val="1134802253"/>
+      </p:ext>
+    </p:extLst>
+  </p:cSld>
+  <p:clrMapOvr>
+    <a:masterClrMapping/>
+  </p:clrMapOvr>
+  <p:transition>
+    <p:fade/>
+  </p:transition>
+</p:sld>
+</file>
+
+<file path=ppt/slides/slide7.xml><?xml version="1.0" encoding="utf-8"?>
+<p:sld xmlns:a="http://schemas.openxmlformats.org/drawingml/2006/main" xmlns:r="http://schemas.openxmlformats.org/officeDocument/2006/relationships" xmlns:p="http://schemas.openxmlformats.org/presentationml/2006/main">
+  <p:cSld>
+    <p:spTree>
+      <p:nvGrpSpPr>
+        <p:cNvPr id="1" name=""/>
+        <p:cNvGrpSpPr/>
+        <p:nvPr/>
+      </p:nvGrpSpPr>
+      <p:grpSpPr>
+        <a:xfrm>
+          <a:off x="0" y="0"/>
+          <a:ext cx="0" cy="0"/>
+          <a:chOff x="0" y="0"/>
+          <a:chExt cx="0" cy="0"/>
+        </a:xfrm>
+      </p:grpSpPr>
+      <p:sp>
+        <p:nvSpPr>
+          <p:cNvPr id="2" name="Title 1"/>
+          <p:cNvSpPr>
+            <a:spLocks noGrp="1"/>
+          </p:cNvSpPr>
+          <p:nvPr>
+            <p:ph type="title"/>
+          </p:nvPr>
+        </p:nvSpPr>
+        <p:spPr/>
+        <p:txBody>
+          <a:bodyPr/>
+          <a:lstStyle/>
+          <a:p>
+            <a:r>
+              <a:rPr lang="en-GB" dirty="0" smtClean="0"/>
+              <a:t>Entity Framework 7</a:t>
+            </a:r>
+            <a:endParaRPr lang="en-GB" dirty="0"/>
+          </a:p>
+        </p:txBody>
+      </p:sp>
+      <p:sp>
+        <p:nvSpPr>
+          <p:cNvPr id="3" name="Text Placeholder 2"/>
+          <p:cNvSpPr>
+            <a:spLocks noGrp="1"/>
+          </p:cNvSpPr>
+          <p:nvPr>
+            <p:ph type="body" sz="quarter" idx="11"/>
+          </p:nvPr>
+        </p:nvSpPr>
+        <p:spPr/>
+        <p:txBody>
+          <a:bodyPr/>
+          <a:lstStyle/>
+          <a:p>
+            <a:r>
+              <a:rPr lang="en-GB" dirty="0"/>
+              <a:t>- </a:t>
+            </a:r>
+            <a:r>
+              <a:rPr lang="en-GB" dirty="0" err="1"/>
+              <a:t>Linq</a:t>
+            </a:r>
+            <a:r>
+              <a:rPr lang="en-GB" dirty="0"/>
+              <a:t> Provider improvements</a:t>
+            </a:r>
+          </a:p>
+          <a:p>
+            <a:r>
+              <a:rPr lang="en-GB" dirty="0"/>
+              <a:t>		- Readable SQL</a:t>
+            </a:r>
+          </a:p>
+          <a:p>
+            <a:r>
+              <a:rPr lang="en-GB" dirty="0"/>
+              <a:t>		- Multiple Queries for large result sets</a:t>
+            </a:r>
+          </a:p>
+          <a:p>
+            <a:r>
+              <a:rPr lang="en-GB" dirty="0"/>
+              <a:t>		- SQL Performance</a:t>
+            </a:r>
+          </a:p>
+          <a:p>
+            <a:r>
+              <a:rPr lang="en-GB" dirty="0"/>
+              <a:t>		- Bulk Inserts</a:t>
+            </a:r>
+          </a:p>
+          <a:p>
+            <a:r>
+              <a:rPr lang="en-GB" dirty="0"/>
+              <a:t>	- Multiple platforms Unix, Windows Phone </a:t>
+            </a:r>
+            <a:r>
+              <a:rPr lang="en-GB" dirty="0" err="1"/>
+              <a:t>etc</a:t>
+            </a:r>
+            <a:endParaRPr lang="en-GB" dirty="0"/>
+          </a:p>
+          <a:p>
+            <a:r>
+              <a:rPr lang="en-GB" dirty="0"/>
+              <a:t>	- Code first only</a:t>
+            </a:r>
+          </a:p>
+          <a:p>
+            <a:r>
+              <a:rPr lang="en-GB" dirty="0"/>
+              <a:t>	- Low memory footprint / Pay-per-Play</a:t>
+            </a:r>
+          </a:p>
+          <a:p>
+            <a:r>
+              <a:rPr lang="en-GB" dirty="0"/>
+              <a:t>	- Support for non-relational DBs</a:t>
+            </a:r>
+          </a:p>
+        </p:txBody>
+      </p:sp>
+      <p:sp>
+        <p:nvSpPr>
+          <p:cNvPr id="4" name="Text Placeholder 3"/>
+          <p:cNvSpPr>
+            <a:spLocks noGrp="1"/>
+          </p:cNvSpPr>
+          <p:nvPr>
+            <p:ph type="body" sz="quarter" idx="12"/>
+          </p:nvPr>
+        </p:nvSpPr>
+        <p:spPr/>
+        <p:txBody>
+          <a:bodyPr/>
+          <a:lstStyle/>
+          <a:p>
+            <a:endParaRPr lang="en-GB"/>
+          </a:p>
+        </p:txBody>
+      </p:sp>
+    </p:spTree>
+    <p:extLst>
+      <p:ext uri="{BB962C8B-B14F-4D97-AF65-F5344CB8AC3E}">
+        <p14:creationId xmlns:p14="http://schemas.microsoft.com/office/powerpoint/2010/main" val="482439626"/>
+      </p:ext>
+    </p:extLst>
+  </p:cSld>
+  <p:clrMapOvr>
+    <a:masterClrMapping/>
+  </p:clrMapOvr>
+  <p:transition>
+    <p:fade/>
+  </p:transition>
+</p:sld>
+</file>
+
+<file path=ppt/slides/slide8.xml><?xml version="1.0" encoding="utf-8"?>
+<p:sld xmlns:a="http://schemas.openxmlformats.org/drawingml/2006/main" xmlns:r="http://schemas.openxmlformats.org/officeDocument/2006/relationships" xmlns:p="http://schemas.openxmlformats.org/presentationml/2006/main">
+  <p:cSld>
+    <p:spTree>
+      <p:nvGrpSpPr>
+        <p:cNvPr id="1" name=""/>
+        <p:cNvGrpSpPr/>
+        <p:nvPr/>
+      </p:nvGrpSpPr>
+      <p:grpSpPr>
+        <a:xfrm>
+          <a:off x="0" y="0"/>
+          <a:ext cx="0" cy="0"/>
+          <a:chOff x="0" y="0"/>
+          <a:chExt cx="0" cy="0"/>
+        </a:xfrm>
+      </p:grpSpPr>
+      <p:sp>
+        <p:nvSpPr>
+          <p:cNvPr id="2" name="Title 1"/>
+          <p:cNvSpPr>
+            <a:spLocks noGrp="1"/>
+          </p:cNvSpPr>
+          <p:nvPr>
+            <p:ph type="title"/>
+          </p:nvPr>
+        </p:nvSpPr>
+        <p:spPr/>
+        <p:txBody>
+          <a:bodyPr/>
+          <a:lstStyle/>
+          <a:p>
+            <a:r>
+              <a:rPr lang="en-GB" dirty="0" smtClean="0"/>
+              <a:t>Resources</a:t>
+            </a:r>
+            <a:endParaRPr lang="en-GB" dirty="0"/>
+          </a:p>
+        </p:txBody>
+      </p:sp>
+      <p:sp>
+        <p:nvSpPr>
+          <p:cNvPr id="3" name="Text Placeholder 2"/>
+          <p:cNvSpPr>
+            <a:spLocks noGrp="1"/>
+          </p:cNvSpPr>
+          <p:nvPr>
+            <p:ph type="body" sz="quarter" idx="11"/>
+          </p:nvPr>
+        </p:nvSpPr>
+        <p:spPr/>
+        <p:txBody>
+          <a:bodyPr/>
+          <a:lstStyle/>
+          <a:p>
+            <a:r>
+              <a:rPr lang="en-GB" dirty="0"/>
+              <a:t>EF Patterns</a:t>
+            </a:r>
+          </a:p>
+          <a:p>
+            <a:pPr lvl="1"/>
+            <a:r>
+              <a:rPr lang="en-GB" dirty="0">
+                <a:hlinkClick r:id="rId2"/>
+              </a:rPr>
+              <a:t>http://mehdi.me/ambient-dbcontext-in-ef6</a:t>
+            </a:r>
+            <a:r>
+              <a:rPr lang="en-GB" dirty="0" smtClean="0">
+                <a:hlinkClick r:id="rId2"/>
+              </a:rPr>
+              <a:t>/</a:t>
+            </a:r>
+            <a:endParaRPr lang="en-GB" dirty="0" smtClean="0"/>
+          </a:p>
+          <a:p>
+            <a:pPr lvl="1"/>
+            <a:endParaRPr lang="en-GB" dirty="0"/>
+          </a:p>
+          <a:p>
+            <a:endParaRPr lang="en-GB" dirty="0"/>
+          </a:p>
+          <a:p>
+            <a:r>
+              <a:rPr lang="en-GB" dirty="0" err="1" smtClean="0"/>
+              <a:t>PerformanceTips</a:t>
+            </a:r>
+            <a:endParaRPr lang="en-GB" dirty="0" smtClean="0"/>
+          </a:p>
+          <a:p>
+            <a:pPr lvl="1"/>
+            <a:r>
+              <a:rPr lang="en-GB">
+                <a:hlinkClick r:id="rId3"/>
+              </a:rPr>
+              <a:t>https</a:t>
+            </a:r>
+            <a:r>
+              <a:rPr lang="en-GB">
+                <a:hlinkClick r:id="rId3"/>
+              </a:rPr>
+              <a:t>://</a:t>
+            </a:r>
+            <a:r>
+              <a:rPr lang="en-GB" smtClean="0">
+                <a:hlinkClick r:id="rId3"/>
+              </a:rPr>
+              <a:t>msdn.microsoft.com/en-gb/data/hh949853.aspx</a:t>
+            </a:r>
+          </a:p>
+          <a:p>
+            <a:pPr lvl="1"/>
+            <a:endParaRPr lang="en-GB">
+              <a:hlinkClick r:id="rId3"/>
+            </a:endParaRPr>
+          </a:p>
+          <a:p>
+            <a:pPr lvl="1"/>
+            <a:r>
+              <a:rPr lang="en-GB" dirty="0" smtClean="0">
+                <a:hlinkClick r:id="rId3"/>
+              </a:rPr>
+              <a:t>http</a:t>
+            </a:r>
+            <a:r>
+              <a:rPr lang="en-GB" dirty="0">
+                <a:hlinkClick r:id="rId3"/>
+              </a:rPr>
+              <a:t>://</a:t>
+            </a:r>
+            <a:r>
+              <a:rPr lang="en-GB" dirty="0" smtClean="0">
+                <a:hlinkClick r:id="rId3"/>
+              </a:rPr>
+              <a:t>www.dotnet-tricks.com/Tutorial/entityframework/J8bO140912-Tips-to-improve-Entity-Framework-Performance.html</a:t>
+            </a:r>
+            <a:endParaRPr lang="en-GB" dirty="0" smtClean="0"/>
+          </a:p>
+          <a:p>
+            <a:pPr lvl="1"/>
+            <a:endParaRPr lang="en-GB" dirty="0" smtClean="0"/>
+          </a:p>
+          <a:p>
+            <a:endParaRPr lang="en-GB" dirty="0"/>
+          </a:p>
+          <a:p>
+            <a:r>
+              <a:rPr lang="en-GB" dirty="0" smtClean="0"/>
+              <a:t>Demo Code Taken From</a:t>
+            </a:r>
+          </a:p>
+          <a:p>
+            <a:pPr lvl="1"/>
+            <a:r>
+              <a:rPr lang="en-GB" dirty="0">
+                <a:hlinkClick r:id="rId4"/>
+              </a:rPr>
+              <a:t>https://</a:t>
+            </a:r>
+            <a:r>
+              <a:rPr lang="en-GB" dirty="0" smtClean="0">
+                <a:hlinkClick r:id="rId4"/>
+              </a:rPr>
+              <a:t>github.com/FransBouma/RawDataAccessBencher</a:t>
+            </a:r>
+            <a:endParaRPr lang="en-GB" dirty="0" smtClean="0"/>
+          </a:p>
+          <a:p>
+            <a:pPr lvl="1"/>
+            <a:endParaRPr lang="en-GB" dirty="0" smtClean="0"/>
+          </a:p>
+          <a:p>
+            <a:endParaRPr lang="en-GB" dirty="0"/>
+          </a:p>
+        </p:txBody>
+      </p:sp>
+      <p:sp>
+        <p:nvSpPr>
+          <p:cNvPr id="4" name="Text Placeholder 3"/>
+          <p:cNvSpPr>
+            <a:spLocks noGrp="1"/>
+          </p:cNvSpPr>
+          <p:nvPr>
+            <p:ph type="body" sz="quarter" idx="12"/>
+          </p:nvPr>
+        </p:nvSpPr>
+        <p:spPr/>
+        <p:txBody>
+          <a:bodyPr/>
+          <a:lstStyle/>
+          <a:p>
+            <a:endParaRPr lang="en-GB"/>
+          </a:p>
+        </p:txBody>
+      </p:sp>
+    </p:spTree>
+    <p:extLst>
+      <p:ext uri="{BB962C8B-B14F-4D97-AF65-F5344CB8AC3E}">
+        <p14:creationId xmlns:p14="http://schemas.microsoft.com/office/powerpoint/2010/main" val="1656296693"/>
       </p:ext>
     </p:extLst>
   </p:cSld>
@@ -11698,28 +12136,6 @@
 </file>
 
 <file path=customXml/item1.xml><?xml version="1.0" encoding="utf-8"?>
-<p:properties xmlns:p="http://schemas.microsoft.com/office/2006/metadata/properties" xmlns:xsi="http://www.w3.org/2001/XMLSchema-instance" xmlns:pc="http://schemas.microsoft.com/office/infopath/2007/PartnerControls">
-  <documentManagement>
-    <_dlc_DocId xmlns="3f10cd6e-67ef-4e06-a184-a118dcfc3794">NJN2WT7UW3MH-7-135</_dlc_DocId>
-    <_dlc_DocIdUrl xmlns="3f10cd6e-67ef-4e06-a184-a118dcfc3794">
-      <Url>http://gmt-teams/support/softdev/_layouts/DocIdRedir.aspx?ID=NJN2WT7UW3MH-7-135</Url>
-      <Description>NJN2WT7UW3MH-7-135</Description>
-    </_dlc_DocIdUrl>
-    <AverageRating xmlns="http://schemas.microsoft.com/sharepoint/v3" xsi:nil="true"/>
-  </documentManagement>
-</p:properties>
-</file>
-
-<file path=customXml/item2.xml><?xml version="1.0" encoding="utf-8"?>
-<?mso-contentType ?>
-<FormTemplates xmlns="http://schemas.microsoft.com/sharepoint/v3/contenttype/forms">
-  <Display>DocumentLibraryForm</Display>
-  <Edit>DocumentLibraryForm</Edit>
-  <New>DocumentLibraryForm</New>
-</FormTemplates>
-</file>
-
-<file path=customXml/item3.xml><?xml version="1.0" encoding="utf-8"?>
 <ct:contentTypeSchema xmlns:ct="http://schemas.microsoft.com/office/2006/metadata/contentType" xmlns:ma="http://schemas.microsoft.com/office/2006/metadata/properties/metaAttributes" ct:_="" ma:_="" ma:contentTypeName="Document" ma:contentTypeID="0x010100399A9BCA57566D4188E9CA16F86D6408" ma:contentTypeVersion="2" ma:contentTypeDescription="Create a new document." ma:contentTypeScope="" ma:versionID="290b8c847d18631d1d483ff51e5fcd5a">
   <xsd:schema xmlns:xsd="http://www.w3.org/2001/XMLSchema" xmlns:xs="http://www.w3.org/2001/XMLSchema" xmlns:p="http://schemas.microsoft.com/office/2006/metadata/properties" xmlns:ns1="http://schemas.microsoft.com/sharepoint/v3" xmlns:ns2="3f10cd6e-67ef-4e06-a184-a118dcfc3794" targetNamespace="http://schemas.microsoft.com/office/2006/metadata/properties" ma:root="true" ma:fieldsID="22722b2315d693ca6744ca36c727b733" ns1:_="" ns2:_="">
     <xsd:import namespace="http://schemas.microsoft.com/sharepoint/v3"/>
@@ -11881,6 +12297,28 @@
 </ct:contentTypeSchema>
 </file>
 
+<file path=customXml/item2.xml><?xml version="1.0" encoding="utf-8"?>
+<?mso-contentType ?>
+<FormTemplates xmlns="http://schemas.microsoft.com/sharepoint/v3/contenttype/forms">
+  <Display>DocumentLibraryForm</Display>
+  <Edit>DocumentLibraryForm</Edit>
+  <New>DocumentLibraryForm</New>
+</FormTemplates>
+</file>
+
+<file path=customXml/item3.xml><?xml version="1.0" encoding="utf-8"?>
+<p:properties xmlns:p="http://schemas.microsoft.com/office/2006/metadata/properties" xmlns:xsi="http://www.w3.org/2001/XMLSchema-instance" xmlns:pc="http://schemas.microsoft.com/office/infopath/2007/PartnerControls">
+  <documentManagement>
+    <_dlc_DocId xmlns="3f10cd6e-67ef-4e06-a184-a118dcfc3794">NJN2WT7UW3MH-7-135</_dlc_DocId>
+    <_dlc_DocIdUrl xmlns="3f10cd6e-67ef-4e06-a184-a118dcfc3794">
+      <Url>http://gmt-teams/support/softdev/_layouts/DocIdRedir.aspx?ID=NJN2WT7UW3MH-7-135</Url>
+      <Description>NJN2WT7UW3MH-7-135</Description>
+    </_dlc_DocIdUrl>
+    <AverageRating xmlns="http://schemas.microsoft.com/sharepoint/v3" xsi:nil="true"/>
+  </documentManagement>
+</p:properties>
+</file>
+
 <file path=customXml/item4.xml><?xml version="1.0" encoding="utf-8"?>
 <?mso-contentType ?>
 <spe:Receivers xmlns:spe="http://schemas.microsoft.com/sharepoint/events">
@@ -11928,25 +12366,6 @@
 </file>
 
 <file path=customXml/itemProps1.xml><?xml version="1.0" encoding="utf-8"?>
-<ds:datastoreItem xmlns:ds="http://schemas.openxmlformats.org/officeDocument/2006/customXml" ds:itemID="{2574B6B6-859E-4D47-B5B5-2F8A663167D3}">
-  <ds:schemaRefs>
-    <ds:schemaRef ds:uri="http://schemas.microsoft.com/office/2006/metadata/properties"/>
-    <ds:schemaRef ds:uri="http://schemas.microsoft.com/office/infopath/2007/PartnerControls"/>
-    <ds:schemaRef ds:uri="3f10cd6e-67ef-4e06-a184-a118dcfc3794"/>
-    <ds:schemaRef ds:uri="http://schemas.microsoft.com/sharepoint/v3"/>
-  </ds:schemaRefs>
-</ds:datastoreItem>
-</file>
-
-<file path=customXml/itemProps2.xml><?xml version="1.0" encoding="utf-8"?>
-<ds:datastoreItem xmlns:ds="http://schemas.openxmlformats.org/officeDocument/2006/customXml" ds:itemID="{D558CF23-FCB3-4D64-BEEA-3B9519B023D9}">
-  <ds:schemaRefs>
-    <ds:schemaRef ds:uri="http://schemas.microsoft.com/sharepoint/v3/contenttype/forms"/>
-  </ds:schemaRefs>
-</ds:datastoreItem>
-</file>
-
-<file path=customXml/itemProps3.xml><?xml version="1.0" encoding="utf-8"?>
 <ds:datastoreItem xmlns:ds="http://schemas.openxmlformats.org/officeDocument/2006/customXml" ds:itemID="{2E4AC93A-CA33-4EB8-84AE-434C71C0433B}">
   <ds:schemaRefs>
     <ds:schemaRef ds:uri="http://schemas.microsoft.com/office/2006/metadata/contentType"/>
@@ -11965,6 +12384,25 @@
 </ds:datastoreItem>
 </file>
 
+<file path=customXml/itemProps2.xml><?xml version="1.0" encoding="utf-8"?>
+<ds:datastoreItem xmlns:ds="http://schemas.openxmlformats.org/officeDocument/2006/customXml" ds:itemID="{D558CF23-FCB3-4D64-BEEA-3B9519B023D9}">
+  <ds:schemaRefs>
+    <ds:schemaRef ds:uri="http://schemas.microsoft.com/sharepoint/v3/contenttype/forms"/>
+  </ds:schemaRefs>
+</ds:datastoreItem>
+</file>
+
+<file path=customXml/itemProps3.xml><?xml version="1.0" encoding="utf-8"?>
+<ds:datastoreItem xmlns:ds="http://schemas.openxmlformats.org/officeDocument/2006/customXml" ds:itemID="{2574B6B6-859E-4D47-B5B5-2F8A663167D3}">
+  <ds:schemaRefs>
+    <ds:schemaRef ds:uri="http://schemas.microsoft.com/office/2006/metadata/properties"/>
+    <ds:schemaRef ds:uri="http://schemas.microsoft.com/office/infopath/2007/PartnerControls"/>
+    <ds:schemaRef ds:uri="3f10cd6e-67ef-4e06-a184-a118dcfc3794"/>
+    <ds:schemaRef ds:uri="http://schemas.microsoft.com/sharepoint/v3"/>
+  </ds:schemaRefs>
+</ds:datastoreItem>
+</file>
+
 <file path=customXml/itemProps4.xml><?xml version="1.0" encoding="utf-8"?>
 <ds:datastoreItem xmlns:ds="http://schemas.openxmlformats.org/officeDocument/2006/customXml" ds:itemID="{5BC4B29C-4555-46F6-A281-17873862A286}">
   <ds:schemaRefs>

</xml_diff>

<commit_message>
Added DbContextScope & Migration with Index
</commit_message>
<xml_diff>
--- a/20160128 Tech Punch - Entity Framework.pptx
+++ b/20160128 Tech Punch - Entity Framework.pptx
@@ -372,7 +372,7 @@
               <a:pPr>
                 <a:defRPr/>
               </a:pPr>
-              <a:t>24/01/2016</a:t>
+              <a:t>25/01/2016</a:t>
             </a:fld>
             <a:endParaRPr lang="en-GB" dirty="0"/>
           </a:p>
@@ -8916,7 +8916,7 @@
           <a:graphicData uri="http://schemas.openxmlformats.org/presentationml/2006/ole">
             <mc:AlternateContent xmlns:mc="http://schemas.openxmlformats.org/markup-compatibility/2006">
               <mc:Choice xmlns:v="urn:schemas-microsoft-com:vml" Requires="v">
-                <p:oleObj spid="_x0000_s2113" name="think-cell Slide" r:id="rId28" imgW="360" imgH="360" progId="">
+                <p:oleObj spid="_x0000_s2116" name="think-cell Slide" r:id="rId28" imgW="360" imgH="360" progId="">
                   <p:embed/>
                 </p:oleObj>
               </mc:Choice>
@@ -10091,7 +10091,7 @@
             <a:pPr lvl="1"/>
             <a:r>
               <a:rPr lang="en-GB" sz="1800" dirty="0" smtClean="0"/>
-              <a:t>How to structure a an Application that uses Repository Pattern</a:t>
+              <a:t>How to structure a Web Application that uses Repository Pattern</a:t>
             </a:r>
           </a:p>
           <a:p>
@@ -10218,120 +10218,6 @@
       </p:sp>
       <p:sp>
         <p:nvSpPr>
-          <p:cNvPr id="12" name="Text Placeholder 2"/>
-          <p:cNvSpPr>
-            <a:spLocks noGrp="1"/>
-          </p:cNvSpPr>
-          <p:nvPr>
-            <p:ph type="body" sz="quarter" idx="11"/>
-          </p:nvPr>
-        </p:nvSpPr>
-        <p:spPr>
-          <a:xfrm>
-            <a:off x="412883" y="2462646"/>
-            <a:ext cx="9073222" cy="3730336"/>
-          </a:xfrm>
-        </p:spPr>
-        <p:txBody>
-          <a:bodyPr/>
-          <a:lstStyle/>
-          <a:p>
-            <a:r>
-              <a:rPr lang="en-GB" sz="1100" dirty="0" smtClean="0"/>
-              <a:t>Asynchronous query and save</a:t>
-            </a:r>
-          </a:p>
-          <a:p>
-            <a:r>
-              <a:rPr lang="en-GB" sz="1100" dirty="0" smtClean="0"/>
-              <a:t>Connection resiliency</a:t>
-            </a:r>
-          </a:p>
-          <a:p>
-            <a:r>
-              <a:rPr lang="en-GB" sz="1100" dirty="0" smtClean="0"/>
-              <a:t>Code based configuration</a:t>
-            </a:r>
-          </a:p>
-          <a:p>
-            <a:r>
-              <a:rPr lang="en-GB" sz="1100" dirty="0" smtClean="0"/>
-              <a:t>Database command interception and logging</a:t>
-            </a:r>
-          </a:p>
-          <a:p>
-            <a:r>
-              <a:rPr lang="en-GB" sz="1100" dirty="0" smtClean="0"/>
-              <a:t>Code first CRUD stored procedures</a:t>
-            </a:r>
-          </a:p>
-          <a:p>
-            <a:r>
-              <a:rPr lang="en-GB" sz="1100" dirty="0" smtClean="0"/>
-              <a:t>Multiple contexts per database</a:t>
-            </a:r>
-          </a:p>
-          <a:p>
-            <a:r>
-              <a:rPr lang="en-GB" sz="1100" dirty="0" smtClean="0"/>
-              <a:t>Default transaction level for generated code first DB is now READ_COMMITTED_SNAPSHOT</a:t>
-            </a:r>
-          </a:p>
-          <a:p>
-            <a:r>
-              <a:rPr lang="en-GB" sz="1100" dirty="0" err="1" smtClean="0"/>
-              <a:t>Enums</a:t>
-            </a:r>
-            <a:r>
-              <a:rPr lang="en-GB" sz="1100" dirty="0" smtClean="0"/>
-              <a:t> and spatial support</a:t>
-            </a:r>
-          </a:p>
-          <a:p>
-            <a:r>
-              <a:rPr lang="en-GB" sz="1100" dirty="0" smtClean="0"/>
-              <a:t>Nested Entity Types</a:t>
-            </a:r>
-          </a:p>
-          <a:p>
-            <a:r>
-              <a:rPr lang="en-GB" sz="1100" dirty="0" smtClean="0"/>
-              <a:t>Support for a default Schema – </a:t>
-            </a:r>
-            <a:r>
-              <a:rPr lang="en-GB" sz="1100" dirty="0" err="1" smtClean="0"/>
-              <a:t>DBModelBuilder.HasDefaultSchema</a:t>
-            </a:r>
-            <a:endParaRPr lang="en-GB" sz="1100" dirty="0" smtClean="0"/>
-          </a:p>
-          <a:p>
-            <a:r>
-              <a:rPr lang="en-GB" sz="1100" dirty="0" smtClean="0"/>
-              <a:t>Configurable migrations history table</a:t>
-            </a:r>
-          </a:p>
-          <a:p>
-            <a:r>
-              <a:rPr lang="en-GB" sz="1100" dirty="0" smtClean="0"/>
-              <a:t>Creating context with an open connection</a:t>
-            </a:r>
-          </a:p>
-          <a:p>
-            <a:r>
-              <a:rPr lang="en-GB" sz="1100" dirty="0" smtClean="0"/>
-              <a:t>Improved transaction support</a:t>
-            </a:r>
-          </a:p>
-          <a:p>
-            <a:endParaRPr lang="en-GB" sz="1000" dirty="0" smtClean="0"/>
-          </a:p>
-          <a:p>
-            <a:endParaRPr lang="en-GB" sz="1000" dirty="0"/>
-          </a:p>
-        </p:txBody>
-      </p:sp>
-      <p:sp>
-        <p:nvSpPr>
           <p:cNvPr id="13" name="Text Placeholder 2"/>
           <p:cNvSpPr txBox="1">
             <a:spLocks/>
@@ -10341,7 +10227,7 @@
         <p:spPr bwMode="auto">
           <a:xfrm>
             <a:off x="412883" y="1014844"/>
-            <a:ext cx="9073222" cy="1572492"/>
+            <a:ext cx="9073222" cy="4242956"/>
           </a:xfrm>
           <a:prstGeom prst="rect">
             <a:avLst/>
@@ -10540,57 +10426,57 @@
           </a:lstStyle>
           <a:p>
             <a:r>
-              <a:rPr lang="en-GB" sz="1100" b="1" kern="0" dirty="0" err="1" smtClean="0"/>
+              <a:rPr lang="en-GB" b="1" kern="0" dirty="0" err="1" smtClean="0"/>
               <a:t>Linq</a:t>
             </a:r>
             <a:r>
-              <a:rPr lang="en-GB" sz="1100" b="1" kern="0" dirty="0" smtClean="0"/>
+              <a:rPr lang="en-GB" b="1" kern="0" dirty="0" smtClean="0"/>
               <a:t> Provider</a:t>
             </a:r>
           </a:p>
           <a:p>
             <a:pPr lvl="1"/>
             <a:r>
-              <a:rPr lang="en-GB" sz="1100" b="1" kern="0" dirty="0" smtClean="0"/>
+              <a:rPr lang="en-GB" sz="1600" b="1" kern="0" dirty="0" smtClean="0"/>
               <a:t>Originated from the </a:t>
             </a:r>
             <a:r>
-              <a:rPr lang="en-GB" sz="1100" b="1" kern="0" dirty="0" err="1" smtClean="0"/>
+              <a:rPr lang="en-GB" sz="1600" b="1" kern="0" dirty="0" err="1" smtClean="0"/>
               <a:t>LinqToSql</a:t>
             </a:r>
             <a:r>
-              <a:rPr lang="en-GB" sz="1100" b="1" kern="0" dirty="0" smtClean="0"/>
+              <a:rPr lang="en-GB" sz="1600" b="1" kern="0" dirty="0" smtClean="0"/>
               <a:t> </a:t>
             </a:r>
             <a:r>
-              <a:rPr lang="en-GB" sz="1100" b="1" kern="0" dirty="0" err="1" smtClean="0"/>
+              <a:rPr lang="en-GB" sz="1600" b="1" kern="0" dirty="0" err="1" smtClean="0"/>
               <a:t>Linq</a:t>
             </a:r>
             <a:r>
-              <a:rPr lang="en-GB" sz="1100" b="1" kern="0" dirty="0" smtClean="0"/>
+              <a:rPr lang="en-GB" sz="1600" b="1" kern="0" dirty="0" smtClean="0"/>
               <a:t> Provider</a:t>
             </a:r>
           </a:p>
           <a:p>
             <a:r>
-              <a:rPr lang="en-GB" sz="1100" b="1" kern="0" dirty="0" err="1" smtClean="0"/>
+              <a:rPr lang="en-GB" b="1" kern="0" dirty="0" err="1" smtClean="0"/>
               <a:t>DbChangeTracker</a:t>
             </a:r>
-            <a:endParaRPr lang="en-GB" sz="1100" b="1" kern="0" dirty="0"/>
+            <a:endParaRPr lang="en-GB" b="1" kern="0" dirty="0"/>
           </a:p>
           <a:p>
             <a:pPr lvl="1"/>
             <a:r>
-              <a:rPr lang="en-GB" sz="1100" b="1" kern="0" dirty="0"/>
+              <a:rPr lang="en-GB" sz="1600" b="1" kern="0" dirty="0"/>
               <a:t>Unit of Work : Maintains a list of objects affected by a business transaction and coordinates the writing out of changes and the resolution of concurrency problems.</a:t>
             </a:r>
           </a:p>
           <a:p>
             <a:r>
-              <a:rPr lang="en-GB" sz="1100" b="1" kern="0" dirty="0" err="1" smtClean="0"/>
+              <a:rPr lang="en-GB" b="1" kern="0" dirty="0" err="1" smtClean="0"/>
               <a:t>DbMigrations</a:t>
             </a:r>
-            <a:endParaRPr lang="en-GB" sz="1100" b="1" kern="0" dirty="0" smtClean="0"/>
+            <a:endParaRPr lang="en-GB" b="1" kern="0" dirty="0" smtClean="0"/>
           </a:p>
           <a:p>
             <a:endParaRPr lang="en-GB" sz="1000" kern="0" dirty="0"/>
@@ -10670,7 +10556,12 @@
             <p:ph type="body" sz="quarter" idx="11"/>
           </p:nvPr>
         </p:nvSpPr>
-        <p:spPr/>
+        <p:spPr>
+          <a:xfrm>
+            <a:off x="412874" y="947887"/>
+            <a:ext cx="9073222" cy="4764499"/>
+          </a:xfrm>
+        </p:spPr>
         <p:txBody>
           <a:bodyPr/>
           <a:lstStyle/>
@@ -10695,12 +10586,16 @@
             </a:r>
           </a:p>
           <a:p>
+            <a:endParaRPr lang="en-GB" dirty="0" smtClean="0"/>
+          </a:p>
+          <a:p>
             <a:r>
               <a:rPr lang="en-GB" dirty="0" smtClean="0"/>
               <a:t>Advantageous</a:t>
             </a:r>
           </a:p>
           <a:p>
+            <a:pPr lvl="1"/>
             <a:r>
               <a:rPr lang="en-GB" dirty="0" smtClean="0"/>
               <a:t>Speed </a:t>
@@ -10711,6 +10606,7 @@
             </a:r>
           </a:p>
           <a:p>
+            <a:pPr lvl="1"/>
             <a:r>
               <a:rPr lang="en-GB" dirty="0" smtClean="0"/>
               <a:t>Better </a:t>
@@ -10721,6 +10617,9 @@
             </a:r>
           </a:p>
           <a:p>
+            <a:endParaRPr lang="en-GB" dirty="0" smtClean="0"/>
+          </a:p>
+          <a:p>
             <a:r>
               <a:rPr lang="en-GB" dirty="0" smtClean="0"/>
               <a:t>Disadvantageous</a:t>
@@ -10728,6 +10627,7 @@
             <a:endParaRPr lang="en-GB" dirty="0"/>
           </a:p>
           <a:p>
+            <a:pPr lvl="1"/>
             <a:r>
               <a:rPr lang="en-GB" dirty="0" smtClean="0"/>
               <a:t>No </a:t>
@@ -10741,13 +10641,29 @@
               <a:t>, </a:t>
             </a:r>
             <a:r>
-              <a:rPr lang="en-GB" dirty="0" err="1"/>
+              <a:rPr lang="en-GB" dirty="0" err="1" smtClean="0"/>
               <a:t>DbMigrations</a:t>
             </a:r>
             <a:r>
-              <a:rPr lang="en-GB" dirty="0"/>
+              <a:rPr lang="en-GB" dirty="0" smtClean="0"/>
+              <a:t>, </a:t>
+            </a:r>
+            <a:r>
+              <a:rPr lang="en-GB" dirty="0" err="1" smtClean="0"/>
+              <a:t>DbChangeTracker</a:t>
+            </a:r>
+            <a:r>
+              <a:rPr lang="en-GB" dirty="0" smtClean="0"/>
               <a:t> features</a:t>
             </a:r>
+          </a:p>
+          <a:p>
+            <a:pPr lvl="1"/>
+            <a:r>
+              <a:rPr lang="en-GB" dirty="0" smtClean="0"/>
+              <a:t>Need to roll write your own select/insert/update/delete queries. This inline SQL needs to be maintained!!</a:t>
+            </a:r>
+            <a:endParaRPr lang="en-GB" dirty="0"/>
           </a:p>
         </p:txBody>
       </p:sp>
@@ -11060,11 +10976,7 @@
           <a:p>
             <a:r>
               <a:rPr lang="en-GB" dirty="0" smtClean="0"/>
-              <a:t>Debug Unit Test in EF Open </a:t>
-            </a:r>
-            <a:r>
-              <a:rPr lang="en-GB" smtClean="0"/>
-              <a:t>Source Library</a:t>
+              <a:t>Debug Unit Test in EF Open Source Library</a:t>
             </a:r>
             <a:endParaRPr lang="en-GB" dirty="0"/>
           </a:p>
@@ -11359,13 +11271,7 @@
               <a:rPr lang="en-GB">
                 <a:hlinkClick r:id="rId3"/>
               </a:rPr>
-              <a:t>https</a:t>
-            </a:r>
-            <a:r>
-              <a:rPr lang="en-GB">
-                <a:hlinkClick r:id="rId3"/>
-              </a:rPr>
-              <a:t>://</a:t>
+              <a:t>https://</a:t>
             </a:r>
             <a:r>
               <a:rPr lang="en-GB" smtClean="0">

</xml_diff>